<commit_message>
typo fix kmeans slides
</commit_message>
<xml_diff>
--- a/slides/Kmeans.pptx
+++ b/slides/Kmeans.pptx
@@ -42773,425 +42773,9 @@
           </a:p>
         </p:txBody>
       </p:sp>
-      <p:cxnSp>
-        <p:nvCxnSpPr>
+      <p:sp>
+        <p:nvSpPr>
           <p:cNvPr id="914" name="Google Shape;914;p52"/>
-          <p:cNvCxnSpPr/>
-          <p:nvPr/>
-        </p:nvCxnSpPr>
-        <p:spPr>
-          <a:xfrm flipH="1" rot="10800000">
-            <a:off x="784650" y="4248200"/>
-            <a:ext cx="7574700" cy="35100"/>
-          </a:xfrm>
-          <a:prstGeom prst="straightConnector1">
-            <a:avLst/>
-          </a:prstGeom>
-          <a:noFill/>
-          <a:ln cap="flat" cmpd="sng" w="38100">
-            <a:solidFill>
-              <a:srgbClr val="000000"/>
-            </a:solidFill>
-            <a:prstDash val="solid"/>
-            <a:round/>
-            <a:headEnd len="med" w="med" type="none"/>
-            <a:tailEnd len="med" w="med" type="none"/>
-          </a:ln>
-        </p:spPr>
-      </p:cxnSp>
-      <p:cxnSp>
-        <p:nvCxnSpPr>
-          <p:cNvPr id="915" name="Google Shape;915;p52"/>
-          <p:cNvCxnSpPr/>
-          <p:nvPr/>
-        </p:nvCxnSpPr>
-        <p:spPr>
-          <a:xfrm flipH="1" rot="10800000">
-            <a:off x="805625" y="3964050"/>
-            <a:ext cx="2100" cy="310500"/>
-          </a:xfrm>
-          <a:prstGeom prst="straightConnector1">
-            <a:avLst/>
-          </a:prstGeom>
-          <a:noFill/>
-          <a:ln cap="flat" cmpd="sng" w="38100">
-            <a:solidFill>
-              <a:srgbClr val="000000"/>
-            </a:solidFill>
-            <a:prstDash val="solid"/>
-            <a:round/>
-            <a:headEnd len="med" w="med" type="none"/>
-            <a:tailEnd len="med" w="med" type="none"/>
-          </a:ln>
-        </p:spPr>
-      </p:cxnSp>
-      <p:cxnSp>
-        <p:nvCxnSpPr>
-          <p:cNvPr id="916" name="Google Shape;916;p52"/>
-          <p:cNvCxnSpPr/>
-          <p:nvPr/>
-        </p:nvCxnSpPr>
-        <p:spPr>
-          <a:xfrm flipH="1" rot="10800000">
-            <a:off x="1344225" y="3964050"/>
-            <a:ext cx="2100" cy="310500"/>
-          </a:xfrm>
-          <a:prstGeom prst="straightConnector1">
-            <a:avLst/>
-          </a:prstGeom>
-          <a:noFill/>
-          <a:ln cap="flat" cmpd="sng" w="38100">
-            <a:solidFill>
-              <a:srgbClr val="000000"/>
-            </a:solidFill>
-            <a:prstDash val="solid"/>
-            <a:round/>
-            <a:headEnd len="med" w="med" type="none"/>
-            <a:tailEnd len="med" w="med" type="none"/>
-          </a:ln>
-        </p:spPr>
-      </p:cxnSp>
-      <p:cxnSp>
-        <p:nvCxnSpPr>
-          <p:cNvPr id="917" name="Google Shape;917;p52"/>
-          <p:cNvCxnSpPr/>
-          <p:nvPr/>
-        </p:nvCxnSpPr>
-        <p:spPr>
-          <a:xfrm flipH="1" rot="10800000">
-            <a:off x="1882825" y="3964050"/>
-            <a:ext cx="2100" cy="310500"/>
-          </a:xfrm>
-          <a:prstGeom prst="straightConnector1">
-            <a:avLst/>
-          </a:prstGeom>
-          <a:noFill/>
-          <a:ln cap="flat" cmpd="sng" w="38100">
-            <a:solidFill>
-              <a:srgbClr val="000000"/>
-            </a:solidFill>
-            <a:prstDash val="solid"/>
-            <a:round/>
-            <a:headEnd len="med" w="med" type="none"/>
-            <a:tailEnd len="med" w="med" type="none"/>
-          </a:ln>
-        </p:spPr>
-      </p:cxnSp>
-      <p:cxnSp>
-        <p:nvCxnSpPr>
-          <p:cNvPr id="918" name="Google Shape;918;p52"/>
-          <p:cNvCxnSpPr/>
-          <p:nvPr/>
-        </p:nvCxnSpPr>
-        <p:spPr>
-          <a:xfrm flipH="1" rot="10800000">
-            <a:off x="2421425" y="3964050"/>
-            <a:ext cx="2100" cy="310500"/>
-          </a:xfrm>
-          <a:prstGeom prst="straightConnector1">
-            <a:avLst/>
-          </a:prstGeom>
-          <a:noFill/>
-          <a:ln cap="flat" cmpd="sng" w="38100">
-            <a:solidFill>
-              <a:srgbClr val="000000"/>
-            </a:solidFill>
-            <a:prstDash val="solid"/>
-            <a:round/>
-            <a:headEnd len="med" w="med" type="none"/>
-            <a:tailEnd len="med" w="med" type="none"/>
-          </a:ln>
-        </p:spPr>
-      </p:cxnSp>
-      <p:cxnSp>
-        <p:nvCxnSpPr>
-          <p:cNvPr id="919" name="Google Shape;919;p52"/>
-          <p:cNvCxnSpPr/>
-          <p:nvPr/>
-        </p:nvCxnSpPr>
-        <p:spPr>
-          <a:xfrm flipH="1" rot="10800000">
-            <a:off x="2960025" y="3964050"/>
-            <a:ext cx="2100" cy="310500"/>
-          </a:xfrm>
-          <a:prstGeom prst="straightConnector1">
-            <a:avLst/>
-          </a:prstGeom>
-          <a:noFill/>
-          <a:ln cap="flat" cmpd="sng" w="38100">
-            <a:solidFill>
-              <a:srgbClr val="000000"/>
-            </a:solidFill>
-            <a:prstDash val="solid"/>
-            <a:round/>
-            <a:headEnd len="med" w="med" type="none"/>
-            <a:tailEnd len="med" w="med" type="none"/>
-          </a:ln>
-        </p:spPr>
-      </p:cxnSp>
-      <p:cxnSp>
-        <p:nvCxnSpPr>
-          <p:cNvPr id="920" name="Google Shape;920;p52"/>
-          <p:cNvCxnSpPr/>
-          <p:nvPr/>
-        </p:nvCxnSpPr>
-        <p:spPr>
-          <a:xfrm flipH="1" rot="10800000">
-            <a:off x="3498625" y="3964050"/>
-            <a:ext cx="2100" cy="310500"/>
-          </a:xfrm>
-          <a:prstGeom prst="straightConnector1">
-            <a:avLst/>
-          </a:prstGeom>
-          <a:noFill/>
-          <a:ln cap="flat" cmpd="sng" w="38100">
-            <a:solidFill>
-              <a:srgbClr val="000000"/>
-            </a:solidFill>
-            <a:prstDash val="solid"/>
-            <a:round/>
-            <a:headEnd len="med" w="med" type="none"/>
-            <a:tailEnd len="med" w="med" type="none"/>
-          </a:ln>
-        </p:spPr>
-      </p:cxnSp>
-      <p:cxnSp>
-        <p:nvCxnSpPr>
-          <p:cNvPr id="921" name="Google Shape;921;p52"/>
-          <p:cNvCxnSpPr/>
-          <p:nvPr/>
-        </p:nvCxnSpPr>
-        <p:spPr>
-          <a:xfrm flipH="1" rot="10800000">
-            <a:off x="4037225" y="3964050"/>
-            <a:ext cx="2100" cy="310500"/>
-          </a:xfrm>
-          <a:prstGeom prst="straightConnector1">
-            <a:avLst/>
-          </a:prstGeom>
-          <a:noFill/>
-          <a:ln cap="flat" cmpd="sng" w="38100">
-            <a:solidFill>
-              <a:srgbClr val="000000"/>
-            </a:solidFill>
-            <a:prstDash val="solid"/>
-            <a:round/>
-            <a:headEnd len="med" w="med" type="none"/>
-            <a:tailEnd len="med" w="med" type="none"/>
-          </a:ln>
-        </p:spPr>
-      </p:cxnSp>
-      <p:cxnSp>
-        <p:nvCxnSpPr>
-          <p:cNvPr id="922" name="Google Shape;922;p52"/>
-          <p:cNvCxnSpPr/>
-          <p:nvPr/>
-        </p:nvCxnSpPr>
-        <p:spPr>
-          <a:xfrm flipH="1" rot="10800000">
-            <a:off x="4575825" y="3964050"/>
-            <a:ext cx="2100" cy="310500"/>
-          </a:xfrm>
-          <a:prstGeom prst="straightConnector1">
-            <a:avLst/>
-          </a:prstGeom>
-          <a:noFill/>
-          <a:ln cap="flat" cmpd="sng" w="38100">
-            <a:solidFill>
-              <a:srgbClr val="000000"/>
-            </a:solidFill>
-            <a:prstDash val="solid"/>
-            <a:round/>
-            <a:headEnd len="med" w="med" type="none"/>
-            <a:tailEnd len="med" w="med" type="none"/>
-          </a:ln>
-        </p:spPr>
-      </p:cxnSp>
-      <p:cxnSp>
-        <p:nvCxnSpPr>
-          <p:cNvPr id="923" name="Google Shape;923;p52"/>
-          <p:cNvCxnSpPr/>
-          <p:nvPr/>
-        </p:nvCxnSpPr>
-        <p:spPr>
-          <a:xfrm flipH="1" rot="10800000">
-            <a:off x="5114425" y="3964050"/>
-            <a:ext cx="2100" cy="310500"/>
-          </a:xfrm>
-          <a:prstGeom prst="straightConnector1">
-            <a:avLst/>
-          </a:prstGeom>
-          <a:noFill/>
-          <a:ln cap="flat" cmpd="sng" w="38100">
-            <a:solidFill>
-              <a:srgbClr val="000000"/>
-            </a:solidFill>
-            <a:prstDash val="solid"/>
-            <a:round/>
-            <a:headEnd len="med" w="med" type="none"/>
-            <a:tailEnd len="med" w="med" type="none"/>
-          </a:ln>
-        </p:spPr>
-      </p:cxnSp>
-      <p:cxnSp>
-        <p:nvCxnSpPr>
-          <p:cNvPr id="924" name="Google Shape;924;p52"/>
-          <p:cNvCxnSpPr/>
-          <p:nvPr/>
-        </p:nvCxnSpPr>
-        <p:spPr>
-          <a:xfrm flipH="1" rot="10800000">
-            <a:off x="5653025" y="3964050"/>
-            <a:ext cx="2100" cy="310500"/>
-          </a:xfrm>
-          <a:prstGeom prst="straightConnector1">
-            <a:avLst/>
-          </a:prstGeom>
-          <a:noFill/>
-          <a:ln cap="flat" cmpd="sng" w="38100">
-            <a:solidFill>
-              <a:srgbClr val="000000"/>
-            </a:solidFill>
-            <a:prstDash val="solid"/>
-            <a:round/>
-            <a:headEnd len="med" w="med" type="none"/>
-            <a:tailEnd len="med" w="med" type="none"/>
-          </a:ln>
-        </p:spPr>
-      </p:cxnSp>
-      <p:cxnSp>
-        <p:nvCxnSpPr>
-          <p:cNvPr id="925" name="Google Shape;925;p52"/>
-          <p:cNvCxnSpPr/>
-          <p:nvPr/>
-        </p:nvCxnSpPr>
-        <p:spPr>
-          <a:xfrm flipH="1" rot="10800000">
-            <a:off x="6191625" y="3964050"/>
-            <a:ext cx="2100" cy="310500"/>
-          </a:xfrm>
-          <a:prstGeom prst="straightConnector1">
-            <a:avLst/>
-          </a:prstGeom>
-          <a:noFill/>
-          <a:ln cap="flat" cmpd="sng" w="38100">
-            <a:solidFill>
-              <a:srgbClr val="000000"/>
-            </a:solidFill>
-            <a:prstDash val="solid"/>
-            <a:round/>
-            <a:headEnd len="med" w="med" type="none"/>
-            <a:tailEnd len="med" w="med" type="none"/>
-          </a:ln>
-        </p:spPr>
-      </p:cxnSp>
-      <p:cxnSp>
-        <p:nvCxnSpPr>
-          <p:cNvPr id="926" name="Google Shape;926;p52"/>
-          <p:cNvCxnSpPr/>
-          <p:nvPr/>
-        </p:nvCxnSpPr>
-        <p:spPr>
-          <a:xfrm flipH="1" rot="10800000">
-            <a:off x="6730225" y="3964050"/>
-            <a:ext cx="2100" cy="310500"/>
-          </a:xfrm>
-          <a:prstGeom prst="straightConnector1">
-            <a:avLst/>
-          </a:prstGeom>
-          <a:noFill/>
-          <a:ln cap="flat" cmpd="sng" w="38100">
-            <a:solidFill>
-              <a:srgbClr val="000000"/>
-            </a:solidFill>
-            <a:prstDash val="solid"/>
-            <a:round/>
-            <a:headEnd len="med" w="med" type="none"/>
-            <a:tailEnd len="med" w="med" type="none"/>
-          </a:ln>
-        </p:spPr>
-      </p:cxnSp>
-      <p:cxnSp>
-        <p:nvCxnSpPr>
-          <p:cNvPr id="927" name="Google Shape;927;p52"/>
-          <p:cNvCxnSpPr/>
-          <p:nvPr/>
-        </p:nvCxnSpPr>
-        <p:spPr>
-          <a:xfrm flipH="1" rot="10800000">
-            <a:off x="7268825" y="3964050"/>
-            <a:ext cx="2100" cy="310500"/>
-          </a:xfrm>
-          <a:prstGeom prst="straightConnector1">
-            <a:avLst/>
-          </a:prstGeom>
-          <a:noFill/>
-          <a:ln cap="flat" cmpd="sng" w="38100">
-            <a:solidFill>
-              <a:srgbClr val="000000"/>
-            </a:solidFill>
-            <a:prstDash val="solid"/>
-            <a:round/>
-            <a:headEnd len="med" w="med" type="none"/>
-            <a:tailEnd len="med" w="med" type="none"/>
-          </a:ln>
-        </p:spPr>
-      </p:cxnSp>
-      <p:cxnSp>
-        <p:nvCxnSpPr>
-          <p:cNvPr id="928" name="Google Shape;928;p52"/>
-          <p:cNvCxnSpPr/>
-          <p:nvPr/>
-        </p:nvCxnSpPr>
-        <p:spPr>
-          <a:xfrm flipH="1" rot="10800000">
-            <a:off x="7807425" y="3964050"/>
-            <a:ext cx="2100" cy="310500"/>
-          </a:xfrm>
-          <a:prstGeom prst="straightConnector1">
-            <a:avLst/>
-          </a:prstGeom>
-          <a:noFill/>
-          <a:ln cap="flat" cmpd="sng" w="38100">
-            <a:solidFill>
-              <a:srgbClr val="000000"/>
-            </a:solidFill>
-            <a:prstDash val="solid"/>
-            <a:round/>
-            <a:headEnd len="med" w="med" type="none"/>
-            <a:tailEnd len="med" w="med" type="none"/>
-          </a:ln>
-        </p:spPr>
-      </p:cxnSp>
-      <p:cxnSp>
-        <p:nvCxnSpPr>
-          <p:cNvPr id="929" name="Google Shape;929;p52"/>
-          <p:cNvCxnSpPr/>
-          <p:nvPr/>
-        </p:nvCxnSpPr>
-        <p:spPr>
-          <a:xfrm flipH="1" rot="10800000">
-            <a:off x="8346025" y="3964050"/>
-            <a:ext cx="2100" cy="310500"/>
-          </a:xfrm>
-          <a:prstGeom prst="straightConnector1">
-            <a:avLst/>
-          </a:prstGeom>
-          <a:noFill/>
-          <a:ln cap="flat" cmpd="sng" w="38100">
-            <a:solidFill>
-              <a:srgbClr val="000000"/>
-            </a:solidFill>
-            <a:prstDash val="solid"/>
-            <a:round/>
-            <a:headEnd len="med" w="med" type="none"/>
-            <a:tailEnd len="med" w="med" type="none"/>
-          </a:ln>
-        </p:spPr>
-      </p:cxnSp>
-      <p:sp>
-        <p:nvSpPr>
-          <p:cNvPr id="930" name="Google Shape;930;p52"/>
           <p:cNvSpPr txBox="1"/>
           <p:nvPr/>
         </p:nvSpPr>
@@ -43243,7 +42827,7 @@
       </p:sp>
       <p:sp>
         <p:nvSpPr>
-          <p:cNvPr id="931" name="Google Shape;931;p52"/>
+          <p:cNvPr id="915" name="Google Shape;915;p52"/>
           <p:cNvSpPr txBox="1"/>
           <p:nvPr/>
         </p:nvSpPr>
@@ -43293,6 +42877,422 @@
           </a:p>
         </p:txBody>
       </p:sp>
+      <p:cxnSp>
+        <p:nvCxnSpPr>
+          <p:cNvPr id="916" name="Google Shape;916;p52"/>
+          <p:cNvCxnSpPr/>
+          <p:nvPr/>
+        </p:nvCxnSpPr>
+        <p:spPr>
+          <a:xfrm flipH="1" rot="10800000">
+            <a:off x="784650" y="4248200"/>
+            <a:ext cx="7574700" cy="35100"/>
+          </a:xfrm>
+          <a:prstGeom prst="straightConnector1">
+            <a:avLst/>
+          </a:prstGeom>
+          <a:noFill/>
+          <a:ln cap="flat" cmpd="sng" w="38100">
+            <a:solidFill>
+              <a:srgbClr val="000000"/>
+            </a:solidFill>
+            <a:prstDash val="solid"/>
+            <a:round/>
+            <a:headEnd len="med" w="med" type="none"/>
+            <a:tailEnd len="med" w="med" type="none"/>
+          </a:ln>
+        </p:spPr>
+      </p:cxnSp>
+      <p:cxnSp>
+        <p:nvCxnSpPr>
+          <p:cNvPr id="917" name="Google Shape;917;p52"/>
+          <p:cNvCxnSpPr/>
+          <p:nvPr/>
+        </p:nvCxnSpPr>
+        <p:spPr>
+          <a:xfrm flipH="1" rot="10800000">
+            <a:off x="805625" y="3964050"/>
+            <a:ext cx="2100" cy="310500"/>
+          </a:xfrm>
+          <a:prstGeom prst="straightConnector1">
+            <a:avLst/>
+          </a:prstGeom>
+          <a:noFill/>
+          <a:ln cap="flat" cmpd="sng" w="38100">
+            <a:solidFill>
+              <a:srgbClr val="000000"/>
+            </a:solidFill>
+            <a:prstDash val="solid"/>
+            <a:round/>
+            <a:headEnd len="med" w="med" type="none"/>
+            <a:tailEnd len="med" w="med" type="none"/>
+          </a:ln>
+        </p:spPr>
+      </p:cxnSp>
+      <p:cxnSp>
+        <p:nvCxnSpPr>
+          <p:cNvPr id="918" name="Google Shape;918;p52"/>
+          <p:cNvCxnSpPr/>
+          <p:nvPr/>
+        </p:nvCxnSpPr>
+        <p:spPr>
+          <a:xfrm flipH="1" rot="10800000">
+            <a:off x="1344225" y="3964050"/>
+            <a:ext cx="2100" cy="310500"/>
+          </a:xfrm>
+          <a:prstGeom prst="straightConnector1">
+            <a:avLst/>
+          </a:prstGeom>
+          <a:noFill/>
+          <a:ln cap="flat" cmpd="sng" w="38100">
+            <a:solidFill>
+              <a:srgbClr val="000000"/>
+            </a:solidFill>
+            <a:prstDash val="solid"/>
+            <a:round/>
+            <a:headEnd len="med" w="med" type="none"/>
+            <a:tailEnd len="med" w="med" type="none"/>
+          </a:ln>
+        </p:spPr>
+      </p:cxnSp>
+      <p:cxnSp>
+        <p:nvCxnSpPr>
+          <p:cNvPr id="919" name="Google Shape;919;p52"/>
+          <p:cNvCxnSpPr/>
+          <p:nvPr/>
+        </p:nvCxnSpPr>
+        <p:spPr>
+          <a:xfrm flipH="1" rot="10800000">
+            <a:off x="1882825" y="3964050"/>
+            <a:ext cx="2100" cy="310500"/>
+          </a:xfrm>
+          <a:prstGeom prst="straightConnector1">
+            <a:avLst/>
+          </a:prstGeom>
+          <a:noFill/>
+          <a:ln cap="flat" cmpd="sng" w="38100">
+            <a:solidFill>
+              <a:srgbClr val="000000"/>
+            </a:solidFill>
+            <a:prstDash val="solid"/>
+            <a:round/>
+            <a:headEnd len="med" w="med" type="none"/>
+            <a:tailEnd len="med" w="med" type="none"/>
+          </a:ln>
+        </p:spPr>
+      </p:cxnSp>
+      <p:cxnSp>
+        <p:nvCxnSpPr>
+          <p:cNvPr id="920" name="Google Shape;920;p52"/>
+          <p:cNvCxnSpPr/>
+          <p:nvPr/>
+        </p:nvCxnSpPr>
+        <p:spPr>
+          <a:xfrm flipH="1" rot="10800000">
+            <a:off x="2421425" y="3964050"/>
+            <a:ext cx="2100" cy="310500"/>
+          </a:xfrm>
+          <a:prstGeom prst="straightConnector1">
+            <a:avLst/>
+          </a:prstGeom>
+          <a:noFill/>
+          <a:ln cap="flat" cmpd="sng" w="38100">
+            <a:solidFill>
+              <a:srgbClr val="000000"/>
+            </a:solidFill>
+            <a:prstDash val="solid"/>
+            <a:round/>
+            <a:headEnd len="med" w="med" type="none"/>
+            <a:tailEnd len="med" w="med" type="none"/>
+          </a:ln>
+        </p:spPr>
+      </p:cxnSp>
+      <p:cxnSp>
+        <p:nvCxnSpPr>
+          <p:cNvPr id="921" name="Google Shape;921;p52"/>
+          <p:cNvCxnSpPr/>
+          <p:nvPr/>
+        </p:nvCxnSpPr>
+        <p:spPr>
+          <a:xfrm flipH="1" rot="10800000">
+            <a:off x="2960025" y="3964050"/>
+            <a:ext cx="2100" cy="310500"/>
+          </a:xfrm>
+          <a:prstGeom prst="straightConnector1">
+            <a:avLst/>
+          </a:prstGeom>
+          <a:noFill/>
+          <a:ln cap="flat" cmpd="sng" w="38100">
+            <a:solidFill>
+              <a:srgbClr val="000000"/>
+            </a:solidFill>
+            <a:prstDash val="solid"/>
+            <a:round/>
+            <a:headEnd len="med" w="med" type="none"/>
+            <a:tailEnd len="med" w="med" type="none"/>
+          </a:ln>
+        </p:spPr>
+      </p:cxnSp>
+      <p:cxnSp>
+        <p:nvCxnSpPr>
+          <p:cNvPr id="922" name="Google Shape;922;p52"/>
+          <p:cNvCxnSpPr/>
+          <p:nvPr/>
+        </p:nvCxnSpPr>
+        <p:spPr>
+          <a:xfrm flipH="1" rot="10800000">
+            <a:off x="3498625" y="3964050"/>
+            <a:ext cx="2100" cy="310500"/>
+          </a:xfrm>
+          <a:prstGeom prst="straightConnector1">
+            <a:avLst/>
+          </a:prstGeom>
+          <a:noFill/>
+          <a:ln cap="flat" cmpd="sng" w="38100">
+            <a:solidFill>
+              <a:srgbClr val="000000"/>
+            </a:solidFill>
+            <a:prstDash val="solid"/>
+            <a:round/>
+            <a:headEnd len="med" w="med" type="none"/>
+            <a:tailEnd len="med" w="med" type="none"/>
+          </a:ln>
+        </p:spPr>
+      </p:cxnSp>
+      <p:cxnSp>
+        <p:nvCxnSpPr>
+          <p:cNvPr id="923" name="Google Shape;923;p52"/>
+          <p:cNvCxnSpPr/>
+          <p:nvPr/>
+        </p:nvCxnSpPr>
+        <p:spPr>
+          <a:xfrm flipH="1" rot="10800000">
+            <a:off x="4037225" y="3964050"/>
+            <a:ext cx="2100" cy="310500"/>
+          </a:xfrm>
+          <a:prstGeom prst="straightConnector1">
+            <a:avLst/>
+          </a:prstGeom>
+          <a:noFill/>
+          <a:ln cap="flat" cmpd="sng" w="38100">
+            <a:solidFill>
+              <a:srgbClr val="000000"/>
+            </a:solidFill>
+            <a:prstDash val="solid"/>
+            <a:round/>
+            <a:headEnd len="med" w="med" type="none"/>
+            <a:tailEnd len="med" w="med" type="none"/>
+          </a:ln>
+        </p:spPr>
+      </p:cxnSp>
+      <p:cxnSp>
+        <p:nvCxnSpPr>
+          <p:cNvPr id="924" name="Google Shape;924;p52"/>
+          <p:cNvCxnSpPr/>
+          <p:nvPr/>
+        </p:nvCxnSpPr>
+        <p:spPr>
+          <a:xfrm flipH="1" rot="10800000">
+            <a:off x="4575825" y="3964050"/>
+            <a:ext cx="2100" cy="310500"/>
+          </a:xfrm>
+          <a:prstGeom prst="straightConnector1">
+            <a:avLst/>
+          </a:prstGeom>
+          <a:noFill/>
+          <a:ln cap="flat" cmpd="sng" w="38100">
+            <a:solidFill>
+              <a:srgbClr val="000000"/>
+            </a:solidFill>
+            <a:prstDash val="solid"/>
+            <a:round/>
+            <a:headEnd len="med" w="med" type="none"/>
+            <a:tailEnd len="med" w="med" type="none"/>
+          </a:ln>
+        </p:spPr>
+      </p:cxnSp>
+      <p:cxnSp>
+        <p:nvCxnSpPr>
+          <p:cNvPr id="925" name="Google Shape;925;p52"/>
+          <p:cNvCxnSpPr/>
+          <p:nvPr/>
+        </p:nvCxnSpPr>
+        <p:spPr>
+          <a:xfrm flipH="1" rot="10800000">
+            <a:off x="5114425" y="3964050"/>
+            <a:ext cx="2100" cy="310500"/>
+          </a:xfrm>
+          <a:prstGeom prst="straightConnector1">
+            <a:avLst/>
+          </a:prstGeom>
+          <a:noFill/>
+          <a:ln cap="flat" cmpd="sng" w="38100">
+            <a:solidFill>
+              <a:srgbClr val="000000"/>
+            </a:solidFill>
+            <a:prstDash val="solid"/>
+            <a:round/>
+            <a:headEnd len="med" w="med" type="none"/>
+            <a:tailEnd len="med" w="med" type="none"/>
+          </a:ln>
+        </p:spPr>
+      </p:cxnSp>
+      <p:cxnSp>
+        <p:nvCxnSpPr>
+          <p:cNvPr id="926" name="Google Shape;926;p52"/>
+          <p:cNvCxnSpPr/>
+          <p:nvPr/>
+        </p:nvCxnSpPr>
+        <p:spPr>
+          <a:xfrm flipH="1" rot="10800000">
+            <a:off x="5653025" y="3964050"/>
+            <a:ext cx="2100" cy="310500"/>
+          </a:xfrm>
+          <a:prstGeom prst="straightConnector1">
+            <a:avLst/>
+          </a:prstGeom>
+          <a:noFill/>
+          <a:ln cap="flat" cmpd="sng" w="38100">
+            <a:solidFill>
+              <a:srgbClr val="000000"/>
+            </a:solidFill>
+            <a:prstDash val="solid"/>
+            <a:round/>
+            <a:headEnd len="med" w="med" type="none"/>
+            <a:tailEnd len="med" w="med" type="none"/>
+          </a:ln>
+        </p:spPr>
+      </p:cxnSp>
+      <p:cxnSp>
+        <p:nvCxnSpPr>
+          <p:cNvPr id="927" name="Google Shape;927;p52"/>
+          <p:cNvCxnSpPr/>
+          <p:nvPr/>
+        </p:nvCxnSpPr>
+        <p:spPr>
+          <a:xfrm flipH="1" rot="10800000">
+            <a:off x="6191625" y="3964050"/>
+            <a:ext cx="2100" cy="310500"/>
+          </a:xfrm>
+          <a:prstGeom prst="straightConnector1">
+            <a:avLst/>
+          </a:prstGeom>
+          <a:noFill/>
+          <a:ln cap="flat" cmpd="sng" w="38100">
+            <a:solidFill>
+              <a:srgbClr val="000000"/>
+            </a:solidFill>
+            <a:prstDash val="solid"/>
+            <a:round/>
+            <a:headEnd len="med" w="med" type="none"/>
+            <a:tailEnd len="med" w="med" type="none"/>
+          </a:ln>
+        </p:spPr>
+      </p:cxnSp>
+      <p:cxnSp>
+        <p:nvCxnSpPr>
+          <p:cNvPr id="928" name="Google Shape;928;p52"/>
+          <p:cNvCxnSpPr/>
+          <p:nvPr/>
+        </p:nvCxnSpPr>
+        <p:spPr>
+          <a:xfrm flipH="1" rot="10800000">
+            <a:off x="6730225" y="3964050"/>
+            <a:ext cx="2100" cy="310500"/>
+          </a:xfrm>
+          <a:prstGeom prst="straightConnector1">
+            <a:avLst/>
+          </a:prstGeom>
+          <a:noFill/>
+          <a:ln cap="flat" cmpd="sng" w="38100">
+            <a:solidFill>
+              <a:srgbClr val="000000"/>
+            </a:solidFill>
+            <a:prstDash val="solid"/>
+            <a:round/>
+            <a:headEnd len="med" w="med" type="none"/>
+            <a:tailEnd len="med" w="med" type="none"/>
+          </a:ln>
+        </p:spPr>
+      </p:cxnSp>
+      <p:cxnSp>
+        <p:nvCxnSpPr>
+          <p:cNvPr id="929" name="Google Shape;929;p52"/>
+          <p:cNvCxnSpPr/>
+          <p:nvPr/>
+        </p:nvCxnSpPr>
+        <p:spPr>
+          <a:xfrm flipH="1" rot="10800000">
+            <a:off x="7268825" y="3964050"/>
+            <a:ext cx="2100" cy="310500"/>
+          </a:xfrm>
+          <a:prstGeom prst="straightConnector1">
+            <a:avLst/>
+          </a:prstGeom>
+          <a:noFill/>
+          <a:ln cap="flat" cmpd="sng" w="38100">
+            <a:solidFill>
+              <a:srgbClr val="000000"/>
+            </a:solidFill>
+            <a:prstDash val="solid"/>
+            <a:round/>
+            <a:headEnd len="med" w="med" type="none"/>
+            <a:tailEnd len="med" w="med" type="none"/>
+          </a:ln>
+        </p:spPr>
+      </p:cxnSp>
+      <p:cxnSp>
+        <p:nvCxnSpPr>
+          <p:cNvPr id="930" name="Google Shape;930;p52"/>
+          <p:cNvCxnSpPr/>
+          <p:nvPr/>
+        </p:nvCxnSpPr>
+        <p:spPr>
+          <a:xfrm flipH="1" rot="10800000">
+            <a:off x="7807425" y="3964050"/>
+            <a:ext cx="2100" cy="310500"/>
+          </a:xfrm>
+          <a:prstGeom prst="straightConnector1">
+            <a:avLst/>
+          </a:prstGeom>
+          <a:noFill/>
+          <a:ln cap="flat" cmpd="sng" w="38100">
+            <a:solidFill>
+              <a:srgbClr val="000000"/>
+            </a:solidFill>
+            <a:prstDash val="solid"/>
+            <a:round/>
+            <a:headEnd len="med" w="med" type="none"/>
+            <a:tailEnd len="med" w="med" type="none"/>
+          </a:ln>
+        </p:spPr>
+      </p:cxnSp>
+      <p:cxnSp>
+        <p:nvCxnSpPr>
+          <p:cNvPr id="931" name="Google Shape;931;p52"/>
+          <p:cNvCxnSpPr/>
+          <p:nvPr/>
+        </p:nvCxnSpPr>
+        <p:spPr>
+          <a:xfrm flipH="1" rot="10800000">
+            <a:off x="8346025" y="3964050"/>
+            <a:ext cx="2100" cy="310500"/>
+          </a:xfrm>
+          <a:prstGeom prst="straightConnector1">
+            <a:avLst/>
+          </a:prstGeom>
+          <a:noFill/>
+          <a:ln cap="flat" cmpd="sng" w="38100">
+            <a:solidFill>
+              <a:srgbClr val="000000"/>
+            </a:solidFill>
+            <a:prstDash val="solid"/>
+            <a:round/>
+            <a:headEnd len="med" w="med" type="none"/>
+            <a:tailEnd len="med" w="med" type="none"/>
+          </a:ln>
+        </p:spPr>
+      </p:cxnSp>
       <p:sp>
         <p:nvSpPr>
           <p:cNvPr id="932" name="Google Shape;932;p52"/>
@@ -43671,7 +43671,7 @@
             </a:pPr>
             <a:r>
               <a:rPr lang="en"/>
-              <a:t>z</a:t>
+              <a:t>x</a:t>
             </a:r>
             <a:endParaRPr/>
           </a:p>
@@ -43719,7 +43719,7 @@
             </a:pPr>
             <a:r>
               <a:rPr lang="en"/>
-              <a:t>z</a:t>
+              <a:t>x</a:t>
             </a:r>
             <a:endParaRPr/>
           </a:p>
@@ -43767,7 +43767,7 @@
             </a:pPr>
             <a:r>
               <a:rPr lang="en"/>
-              <a:t>z</a:t>
+              <a:t>x</a:t>
             </a:r>
             <a:endParaRPr/>
           </a:p>
@@ -43815,7 +43815,7 @@
             </a:pPr>
             <a:r>
               <a:rPr lang="en"/>
-              <a:t>z</a:t>
+              <a:t>x</a:t>
             </a:r>
             <a:endParaRPr/>
           </a:p>
@@ -43863,7 +43863,7 @@
             </a:pPr>
             <a:r>
               <a:rPr lang="en"/>
-              <a:t>z</a:t>
+              <a:t>x</a:t>
             </a:r>
             <a:endParaRPr/>
           </a:p>
@@ -43911,7 +43911,7 @@
             </a:pPr>
             <a:r>
               <a:rPr lang="en"/>
-              <a:t>z</a:t>
+              <a:t>x</a:t>
             </a:r>
             <a:endParaRPr/>
           </a:p>
@@ -43959,7 +43959,7 @@
             </a:pPr>
             <a:r>
               <a:rPr lang="en"/>
-              <a:t>z</a:t>
+              <a:t>x</a:t>
             </a:r>
             <a:endParaRPr/>
           </a:p>
@@ -45600,7 +45600,7 @@
             </a:pPr>
             <a:r>
               <a:rPr lang="en"/>
-              <a:t>z</a:t>
+              <a:t>x</a:t>
             </a:r>
             <a:endParaRPr/>
           </a:p>
@@ -45648,7 +45648,7 @@
             </a:pPr>
             <a:r>
               <a:rPr lang="en"/>
-              <a:t>z</a:t>
+              <a:t>x</a:t>
             </a:r>
             <a:endParaRPr/>
           </a:p>
@@ -45696,7 +45696,7 @@
             </a:pPr>
             <a:r>
               <a:rPr lang="en"/>
-              <a:t>z</a:t>
+              <a:t>x</a:t>
             </a:r>
             <a:endParaRPr/>
           </a:p>
@@ -45744,7 +45744,7 @@
             </a:pPr>
             <a:r>
               <a:rPr lang="en"/>
-              <a:t>z</a:t>
+              <a:t>x</a:t>
             </a:r>
             <a:endParaRPr/>
           </a:p>
@@ -45792,7 +45792,7 @@
             </a:pPr>
             <a:r>
               <a:rPr lang="en"/>
-              <a:t>z</a:t>
+              <a:t>x</a:t>
             </a:r>
             <a:endParaRPr/>
           </a:p>
@@ -45840,7 +45840,7 @@
             </a:pPr>
             <a:r>
               <a:rPr lang="en"/>
-              <a:t>z</a:t>
+              <a:t>x</a:t>
             </a:r>
             <a:endParaRPr/>
           </a:p>
@@ -45888,7 +45888,7 @@
             </a:pPr>
             <a:r>
               <a:rPr lang="en"/>
-              <a:t>z</a:t>
+              <a:t>x</a:t>
             </a:r>
             <a:endParaRPr/>
           </a:p>
@@ -46019,425 +46019,9 @@
           </a:p>
         </p:txBody>
       </p:sp>
-      <p:cxnSp>
-        <p:nvCxnSpPr>
+      <p:sp>
+        <p:nvSpPr>
           <p:cNvPr id="996" name="Google Shape;996;p54"/>
-          <p:cNvCxnSpPr/>
-          <p:nvPr/>
-        </p:nvCxnSpPr>
-        <p:spPr>
-          <a:xfrm flipH="1" rot="10800000">
-            <a:off x="784650" y="4248200"/>
-            <a:ext cx="7574700" cy="35100"/>
-          </a:xfrm>
-          <a:prstGeom prst="straightConnector1">
-            <a:avLst/>
-          </a:prstGeom>
-          <a:noFill/>
-          <a:ln cap="flat" cmpd="sng" w="38100">
-            <a:solidFill>
-              <a:srgbClr val="000000"/>
-            </a:solidFill>
-            <a:prstDash val="solid"/>
-            <a:round/>
-            <a:headEnd len="med" w="med" type="none"/>
-            <a:tailEnd len="med" w="med" type="none"/>
-          </a:ln>
-        </p:spPr>
-      </p:cxnSp>
-      <p:cxnSp>
-        <p:nvCxnSpPr>
-          <p:cNvPr id="997" name="Google Shape;997;p54"/>
-          <p:cNvCxnSpPr/>
-          <p:nvPr/>
-        </p:nvCxnSpPr>
-        <p:spPr>
-          <a:xfrm flipH="1" rot="10800000">
-            <a:off x="805625" y="3964050"/>
-            <a:ext cx="2100" cy="310500"/>
-          </a:xfrm>
-          <a:prstGeom prst="straightConnector1">
-            <a:avLst/>
-          </a:prstGeom>
-          <a:noFill/>
-          <a:ln cap="flat" cmpd="sng" w="38100">
-            <a:solidFill>
-              <a:srgbClr val="000000"/>
-            </a:solidFill>
-            <a:prstDash val="solid"/>
-            <a:round/>
-            <a:headEnd len="med" w="med" type="none"/>
-            <a:tailEnd len="med" w="med" type="none"/>
-          </a:ln>
-        </p:spPr>
-      </p:cxnSp>
-      <p:cxnSp>
-        <p:nvCxnSpPr>
-          <p:cNvPr id="998" name="Google Shape;998;p54"/>
-          <p:cNvCxnSpPr/>
-          <p:nvPr/>
-        </p:nvCxnSpPr>
-        <p:spPr>
-          <a:xfrm flipH="1" rot="10800000">
-            <a:off x="1344225" y="3964050"/>
-            <a:ext cx="2100" cy="310500"/>
-          </a:xfrm>
-          <a:prstGeom prst="straightConnector1">
-            <a:avLst/>
-          </a:prstGeom>
-          <a:noFill/>
-          <a:ln cap="flat" cmpd="sng" w="38100">
-            <a:solidFill>
-              <a:srgbClr val="000000"/>
-            </a:solidFill>
-            <a:prstDash val="solid"/>
-            <a:round/>
-            <a:headEnd len="med" w="med" type="none"/>
-            <a:tailEnd len="med" w="med" type="none"/>
-          </a:ln>
-        </p:spPr>
-      </p:cxnSp>
-      <p:cxnSp>
-        <p:nvCxnSpPr>
-          <p:cNvPr id="999" name="Google Shape;999;p54"/>
-          <p:cNvCxnSpPr/>
-          <p:nvPr/>
-        </p:nvCxnSpPr>
-        <p:spPr>
-          <a:xfrm flipH="1" rot="10800000">
-            <a:off x="1882825" y="3964050"/>
-            <a:ext cx="2100" cy="310500"/>
-          </a:xfrm>
-          <a:prstGeom prst="straightConnector1">
-            <a:avLst/>
-          </a:prstGeom>
-          <a:noFill/>
-          <a:ln cap="flat" cmpd="sng" w="38100">
-            <a:solidFill>
-              <a:srgbClr val="000000"/>
-            </a:solidFill>
-            <a:prstDash val="solid"/>
-            <a:round/>
-            <a:headEnd len="med" w="med" type="none"/>
-            <a:tailEnd len="med" w="med" type="none"/>
-          </a:ln>
-        </p:spPr>
-      </p:cxnSp>
-      <p:cxnSp>
-        <p:nvCxnSpPr>
-          <p:cNvPr id="1000" name="Google Shape;1000;p54"/>
-          <p:cNvCxnSpPr/>
-          <p:nvPr/>
-        </p:nvCxnSpPr>
-        <p:spPr>
-          <a:xfrm flipH="1" rot="10800000">
-            <a:off x="2421425" y="3964050"/>
-            <a:ext cx="2100" cy="310500"/>
-          </a:xfrm>
-          <a:prstGeom prst="straightConnector1">
-            <a:avLst/>
-          </a:prstGeom>
-          <a:noFill/>
-          <a:ln cap="flat" cmpd="sng" w="38100">
-            <a:solidFill>
-              <a:srgbClr val="000000"/>
-            </a:solidFill>
-            <a:prstDash val="solid"/>
-            <a:round/>
-            <a:headEnd len="med" w="med" type="none"/>
-            <a:tailEnd len="med" w="med" type="none"/>
-          </a:ln>
-        </p:spPr>
-      </p:cxnSp>
-      <p:cxnSp>
-        <p:nvCxnSpPr>
-          <p:cNvPr id="1001" name="Google Shape;1001;p54"/>
-          <p:cNvCxnSpPr/>
-          <p:nvPr/>
-        </p:nvCxnSpPr>
-        <p:spPr>
-          <a:xfrm flipH="1" rot="10800000">
-            <a:off x="2960025" y="3964050"/>
-            <a:ext cx="2100" cy="310500"/>
-          </a:xfrm>
-          <a:prstGeom prst="straightConnector1">
-            <a:avLst/>
-          </a:prstGeom>
-          <a:noFill/>
-          <a:ln cap="flat" cmpd="sng" w="38100">
-            <a:solidFill>
-              <a:srgbClr val="000000"/>
-            </a:solidFill>
-            <a:prstDash val="solid"/>
-            <a:round/>
-            <a:headEnd len="med" w="med" type="none"/>
-            <a:tailEnd len="med" w="med" type="none"/>
-          </a:ln>
-        </p:spPr>
-      </p:cxnSp>
-      <p:cxnSp>
-        <p:nvCxnSpPr>
-          <p:cNvPr id="1002" name="Google Shape;1002;p54"/>
-          <p:cNvCxnSpPr/>
-          <p:nvPr/>
-        </p:nvCxnSpPr>
-        <p:spPr>
-          <a:xfrm flipH="1" rot="10800000">
-            <a:off x="3498625" y="3964050"/>
-            <a:ext cx="2100" cy="310500"/>
-          </a:xfrm>
-          <a:prstGeom prst="straightConnector1">
-            <a:avLst/>
-          </a:prstGeom>
-          <a:noFill/>
-          <a:ln cap="flat" cmpd="sng" w="38100">
-            <a:solidFill>
-              <a:srgbClr val="000000"/>
-            </a:solidFill>
-            <a:prstDash val="solid"/>
-            <a:round/>
-            <a:headEnd len="med" w="med" type="none"/>
-            <a:tailEnd len="med" w="med" type="none"/>
-          </a:ln>
-        </p:spPr>
-      </p:cxnSp>
-      <p:cxnSp>
-        <p:nvCxnSpPr>
-          <p:cNvPr id="1003" name="Google Shape;1003;p54"/>
-          <p:cNvCxnSpPr/>
-          <p:nvPr/>
-        </p:nvCxnSpPr>
-        <p:spPr>
-          <a:xfrm flipH="1" rot="10800000">
-            <a:off x="4037225" y="3964050"/>
-            <a:ext cx="2100" cy="310500"/>
-          </a:xfrm>
-          <a:prstGeom prst="straightConnector1">
-            <a:avLst/>
-          </a:prstGeom>
-          <a:noFill/>
-          <a:ln cap="flat" cmpd="sng" w="38100">
-            <a:solidFill>
-              <a:srgbClr val="000000"/>
-            </a:solidFill>
-            <a:prstDash val="solid"/>
-            <a:round/>
-            <a:headEnd len="med" w="med" type="none"/>
-            <a:tailEnd len="med" w="med" type="none"/>
-          </a:ln>
-        </p:spPr>
-      </p:cxnSp>
-      <p:cxnSp>
-        <p:nvCxnSpPr>
-          <p:cNvPr id="1004" name="Google Shape;1004;p54"/>
-          <p:cNvCxnSpPr/>
-          <p:nvPr/>
-        </p:nvCxnSpPr>
-        <p:spPr>
-          <a:xfrm flipH="1" rot="10800000">
-            <a:off x="4575825" y="3964050"/>
-            <a:ext cx="2100" cy="310500"/>
-          </a:xfrm>
-          <a:prstGeom prst="straightConnector1">
-            <a:avLst/>
-          </a:prstGeom>
-          <a:noFill/>
-          <a:ln cap="flat" cmpd="sng" w="38100">
-            <a:solidFill>
-              <a:srgbClr val="000000"/>
-            </a:solidFill>
-            <a:prstDash val="solid"/>
-            <a:round/>
-            <a:headEnd len="med" w="med" type="none"/>
-            <a:tailEnd len="med" w="med" type="none"/>
-          </a:ln>
-        </p:spPr>
-      </p:cxnSp>
-      <p:cxnSp>
-        <p:nvCxnSpPr>
-          <p:cNvPr id="1005" name="Google Shape;1005;p54"/>
-          <p:cNvCxnSpPr/>
-          <p:nvPr/>
-        </p:nvCxnSpPr>
-        <p:spPr>
-          <a:xfrm flipH="1" rot="10800000">
-            <a:off x="5114425" y="3964050"/>
-            <a:ext cx="2100" cy="310500"/>
-          </a:xfrm>
-          <a:prstGeom prst="straightConnector1">
-            <a:avLst/>
-          </a:prstGeom>
-          <a:noFill/>
-          <a:ln cap="flat" cmpd="sng" w="38100">
-            <a:solidFill>
-              <a:srgbClr val="000000"/>
-            </a:solidFill>
-            <a:prstDash val="solid"/>
-            <a:round/>
-            <a:headEnd len="med" w="med" type="none"/>
-            <a:tailEnd len="med" w="med" type="none"/>
-          </a:ln>
-        </p:spPr>
-      </p:cxnSp>
-      <p:cxnSp>
-        <p:nvCxnSpPr>
-          <p:cNvPr id="1006" name="Google Shape;1006;p54"/>
-          <p:cNvCxnSpPr/>
-          <p:nvPr/>
-        </p:nvCxnSpPr>
-        <p:spPr>
-          <a:xfrm flipH="1" rot="10800000">
-            <a:off x="5653025" y="3964050"/>
-            <a:ext cx="2100" cy="310500"/>
-          </a:xfrm>
-          <a:prstGeom prst="straightConnector1">
-            <a:avLst/>
-          </a:prstGeom>
-          <a:noFill/>
-          <a:ln cap="flat" cmpd="sng" w="38100">
-            <a:solidFill>
-              <a:srgbClr val="000000"/>
-            </a:solidFill>
-            <a:prstDash val="solid"/>
-            <a:round/>
-            <a:headEnd len="med" w="med" type="none"/>
-            <a:tailEnd len="med" w="med" type="none"/>
-          </a:ln>
-        </p:spPr>
-      </p:cxnSp>
-      <p:cxnSp>
-        <p:nvCxnSpPr>
-          <p:cNvPr id="1007" name="Google Shape;1007;p54"/>
-          <p:cNvCxnSpPr/>
-          <p:nvPr/>
-        </p:nvCxnSpPr>
-        <p:spPr>
-          <a:xfrm flipH="1" rot="10800000">
-            <a:off x="6191625" y="3964050"/>
-            <a:ext cx="2100" cy="310500"/>
-          </a:xfrm>
-          <a:prstGeom prst="straightConnector1">
-            <a:avLst/>
-          </a:prstGeom>
-          <a:noFill/>
-          <a:ln cap="flat" cmpd="sng" w="38100">
-            <a:solidFill>
-              <a:srgbClr val="000000"/>
-            </a:solidFill>
-            <a:prstDash val="solid"/>
-            <a:round/>
-            <a:headEnd len="med" w="med" type="none"/>
-            <a:tailEnd len="med" w="med" type="none"/>
-          </a:ln>
-        </p:spPr>
-      </p:cxnSp>
-      <p:cxnSp>
-        <p:nvCxnSpPr>
-          <p:cNvPr id="1008" name="Google Shape;1008;p54"/>
-          <p:cNvCxnSpPr/>
-          <p:nvPr/>
-        </p:nvCxnSpPr>
-        <p:spPr>
-          <a:xfrm flipH="1" rot="10800000">
-            <a:off x="6730225" y="3964050"/>
-            <a:ext cx="2100" cy="310500"/>
-          </a:xfrm>
-          <a:prstGeom prst="straightConnector1">
-            <a:avLst/>
-          </a:prstGeom>
-          <a:noFill/>
-          <a:ln cap="flat" cmpd="sng" w="38100">
-            <a:solidFill>
-              <a:srgbClr val="000000"/>
-            </a:solidFill>
-            <a:prstDash val="solid"/>
-            <a:round/>
-            <a:headEnd len="med" w="med" type="none"/>
-            <a:tailEnd len="med" w="med" type="none"/>
-          </a:ln>
-        </p:spPr>
-      </p:cxnSp>
-      <p:cxnSp>
-        <p:nvCxnSpPr>
-          <p:cNvPr id="1009" name="Google Shape;1009;p54"/>
-          <p:cNvCxnSpPr/>
-          <p:nvPr/>
-        </p:nvCxnSpPr>
-        <p:spPr>
-          <a:xfrm flipH="1" rot="10800000">
-            <a:off x="7268825" y="3964050"/>
-            <a:ext cx="2100" cy="310500"/>
-          </a:xfrm>
-          <a:prstGeom prst="straightConnector1">
-            <a:avLst/>
-          </a:prstGeom>
-          <a:noFill/>
-          <a:ln cap="flat" cmpd="sng" w="38100">
-            <a:solidFill>
-              <a:srgbClr val="000000"/>
-            </a:solidFill>
-            <a:prstDash val="solid"/>
-            <a:round/>
-            <a:headEnd len="med" w="med" type="none"/>
-            <a:tailEnd len="med" w="med" type="none"/>
-          </a:ln>
-        </p:spPr>
-      </p:cxnSp>
-      <p:cxnSp>
-        <p:nvCxnSpPr>
-          <p:cNvPr id="1010" name="Google Shape;1010;p54"/>
-          <p:cNvCxnSpPr/>
-          <p:nvPr/>
-        </p:nvCxnSpPr>
-        <p:spPr>
-          <a:xfrm flipH="1" rot="10800000">
-            <a:off x="7807425" y="3964050"/>
-            <a:ext cx="2100" cy="310500"/>
-          </a:xfrm>
-          <a:prstGeom prst="straightConnector1">
-            <a:avLst/>
-          </a:prstGeom>
-          <a:noFill/>
-          <a:ln cap="flat" cmpd="sng" w="38100">
-            <a:solidFill>
-              <a:srgbClr val="000000"/>
-            </a:solidFill>
-            <a:prstDash val="solid"/>
-            <a:round/>
-            <a:headEnd len="med" w="med" type="none"/>
-            <a:tailEnd len="med" w="med" type="none"/>
-          </a:ln>
-        </p:spPr>
-      </p:cxnSp>
-      <p:cxnSp>
-        <p:nvCxnSpPr>
-          <p:cNvPr id="1011" name="Google Shape;1011;p54"/>
-          <p:cNvCxnSpPr/>
-          <p:nvPr/>
-        </p:nvCxnSpPr>
-        <p:spPr>
-          <a:xfrm flipH="1" rot="10800000">
-            <a:off x="8346025" y="3964050"/>
-            <a:ext cx="2100" cy="310500"/>
-          </a:xfrm>
-          <a:prstGeom prst="straightConnector1">
-            <a:avLst/>
-          </a:prstGeom>
-          <a:noFill/>
-          <a:ln cap="flat" cmpd="sng" w="38100">
-            <a:solidFill>
-              <a:srgbClr val="000000"/>
-            </a:solidFill>
-            <a:prstDash val="solid"/>
-            <a:round/>
-            <a:headEnd len="med" w="med" type="none"/>
-            <a:tailEnd len="med" w="med" type="none"/>
-          </a:ln>
-        </p:spPr>
-      </p:cxnSp>
-      <p:sp>
-        <p:nvSpPr>
-          <p:cNvPr id="1012" name="Google Shape;1012;p54"/>
           <p:cNvSpPr txBox="1"/>
           <p:nvPr/>
         </p:nvSpPr>
@@ -46489,7 +46073,7 @@
       </p:sp>
       <p:sp>
         <p:nvSpPr>
-          <p:cNvPr id="1013" name="Google Shape;1013;p54"/>
+          <p:cNvPr id="997" name="Google Shape;997;p54"/>
           <p:cNvSpPr txBox="1"/>
           <p:nvPr/>
         </p:nvSpPr>
@@ -46621,679 +46205,7 @@
       </p:sp>
       <p:sp>
         <p:nvSpPr>
-          <p:cNvPr id="1014" name="Google Shape;1014;p54"/>
-          <p:cNvSpPr/>
-          <p:nvPr/>
-        </p:nvSpPr>
-        <p:spPr>
-          <a:xfrm>
-            <a:off x="935513" y="3917125"/>
-            <a:ext cx="257700" cy="269100"/>
-          </a:xfrm>
-          <a:prstGeom prst="ellipse">
-            <a:avLst/>
-          </a:prstGeom>
-          <a:noFill/>
-          <a:ln cap="flat" cmpd="sng" w="19050">
-            <a:solidFill>
-              <a:srgbClr val="000000"/>
-            </a:solidFill>
-            <a:prstDash val="solid"/>
-            <a:round/>
-            <a:headEnd len="sm" w="sm" type="none"/>
-            <a:tailEnd len="sm" w="sm" type="none"/>
-          </a:ln>
-        </p:spPr>
-        <p:txBody>
-          <a:bodyPr anchorCtr="0" anchor="ctr" bIns="91425" lIns="91425" spcFirstLastPara="1" rIns="91425" wrap="square" tIns="91425">
-            <a:noAutofit/>
-          </a:bodyPr>
-          <a:lstStyle/>
-          <a:p>
-            <a:pPr indent="0" lvl="0" marL="0" rtl="0" algn="l">
-              <a:spcBef>
-                <a:spcPts val="0"/>
-              </a:spcBef>
-              <a:spcAft>
-                <a:spcPts val="0"/>
-              </a:spcAft>
-              <a:buNone/>
-            </a:pPr>
-            <a:r>
-              <a:rPr lang="en"/>
-              <a:t>z</a:t>
-            </a:r>
-            <a:endParaRPr/>
-          </a:p>
-        </p:txBody>
-      </p:sp>
-      <p:sp>
-        <p:nvSpPr>
-          <p:cNvPr id="1015" name="Google Shape;1015;p54"/>
-          <p:cNvSpPr/>
-          <p:nvPr/>
-        </p:nvSpPr>
-        <p:spPr>
-          <a:xfrm>
-            <a:off x="1485713" y="3917125"/>
-            <a:ext cx="257700" cy="269100"/>
-          </a:xfrm>
-          <a:prstGeom prst="ellipse">
-            <a:avLst/>
-          </a:prstGeom>
-          <a:noFill/>
-          <a:ln cap="flat" cmpd="sng" w="19050">
-            <a:solidFill>
-              <a:srgbClr val="000000"/>
-            </a:solidFill>
-            <a:prstDash val="solid"/>
-            <a:round/>
-            <a:headEnd len="sm" w="sm" type="none"/>
-            <a:tailEnd len="sm" w="sm" type="none"/>
-          </a:ln>
-        </p:spPr>
-        <p:txBody>
-          <a:bodyPr anchorCtr="0" anchor="ctr" bIns="91425" lIns="91425" spcFirstLastPara="1" rIns="91425" wrap="square" tIns="91425">
-            <a:noAutofit/>
-          </a:bodyPr>
-          <a:lstStyle/>
-          <a:p>
-            <a:pPr indent="0" lvl="0" marL="0" rtl="0" algn="l">
-              <a:spcBef>
-                <a:spcPts val="0"/>
-              </a:spcBef>
-              <a:spcAft>
-                <a:spcPts val="0"/>
-              </a:spcAft>
-              <a:buNone/>
-            </a:pPr>
-            <a:r>
-              <a:rPr lang="en"/>
-              <a:t>y</a:t>
-            </a:r>
-            <a:endParaRPr/>
-          </a:p>
-        </p:txBody>
-      </p:sp>
-      <p:sp>
-        <p:nvSpPr>
-          <p:cNvPr id="1016" name="Google Shape;1016;p54"/>
-          <p:cNvSpPr/>
-          <p:nvPr/>
-        </p:nvSpPr>
-        <p:spPr>
-          <a:xfrm>
-            <a:off x="2024313" y="3917125"/>
-            <a:ext cx="257700" cy="269100"/>
-          </a:xfrm>
-          <a:prstGeom prst="ellipse">
-            <a:avLst/>
-          </a:prstGeom>
-          <a:noFill/>
-          <a:ln cap="flat" cmpd="sng" w="19050">
-            <a:solidFill>
-              <a:srgbClr val="000000"/>
-            </a:solidFill>
-            <a:prstDash val="solid"/>
-            <a:round/>
-            <a:headEnd len="sm" w="sm" type="none"/>
-            <a:tailEnd len="sm" w="sm" type="none"/>
-          </a:ln>
-        </p:spPr>
-        <p:txBody>
-          <a:bodyPr anchorCtr="0" anchor="ctr" bIns="91425" lIns="91425" spcFirstLastPara="1" rIns="91425" wrap="square" tIns="91425">
-            <a:noAutofit/>
-          </a:bodyPr>
-          <a:lstStyle/>
-          <a:p>
-            <a:pPr indent="0" lvl="0" marL="0" rtl="0" algn="l">
-              <a:spcBef>
-                <a:spcPts val="0"/>
-              </a:spcBef>
-              <a:spcAft>
-                <a:spcPts val="0"/>
-              </a:spcAft>
-              <a:buNone/>
-            </a:pPr>
-            <a:r>
-              <a:rPr lang="en"/>
-              <a:t>y</a:t>
-            </a:r>
-            <a:endParaRPr/>
-          </a:p>
-        </p:txBody>
-      </p:sp>
-      <p:sp>
-        <p:nvSpPr>
-          <p:cNvPr id="1017" name="Google Shape;1017;p54"/>
-          <p:cNvSpPr/>
-          <p:nvPr/>
-        </p:nvSpPr>
-        <p:spPr>
-          <a:xfrm>
-            <a:off x="2574513" y="3917125"/>
-            <a:ext cx="257700" cy="269100"/>
-          </a:xfrm>
-          <a:prstGeom prst="ellipse">
-            <a:avLst/>
-          </a:prstGeom>
-          <a:noFill/>
-          <a:ln cap="flat" cmpd="sng" w="19050">
-            <a:solidFill>
-              <a:srgbClr val="000000"/>
-            </a:solidFill>
-            <a:prstDash val="solid"/>
-            <a:round/>
-            <a:headEnd len="sm" w="sm" type="none"/>
-            <a:tailEnd len="sm" w="sm" type="none"/>
-          </a:ln>
-        </p:spPr>
-        <p:txBody>
-          <a:bodyPr anchorCtr="0" anchor="ctr" bIns="91425" lIns="91425" spcFirstLastPara="1" rIns="91425" wrap="square" tIns="91425">
-            <a:noAutofit/>
-          </a:bodyPr>
-          <a:lstStyle/>
-          <a:p>
-            <a:pPr indent="0" lvl="0" marL="0" rtl="0" algn="l">
-              <a:spcBef>
-                <a:spcPts val="0"/>
-              </a:spcBef>
-              <a:spcAft>
-                <a:spcPts val="0"/>
-              </a:spcAft>
-              <a:buNone/>
-            </a:pPr>
-            <a:r>
-              <a:rPr lang="en"/>
-              <a:t>y</a:t>
-            </a:r>
-            <a:endParaRPr/>
-          </a:p>
-        </p:txBody>
-      </p:sp>
-      <p:sp>
-        <p:nvSpPr>
-          <p:cNvPr id="1018" name="Google Shape;1018;p54"/>
-          <p:cNvSpPr/>
-          <p:nvPr/>
-        </p:nvSpPr>
-        <p:spPr>
-          <a:xfrm>
-            <a:off x="3113113" y="3917125"/>
-            <a:ext cx="257700" cy="269100"/>
-          </a:xfrm>
-          <a:prstGeom prst="ellipse">
-            <a:avLst/>
-          </a:prstGeom>
-          <a:noFill/>
-          <a:ln cap="flat" cmpd="sng" w="19050">
-            <a:solidFill>
-              <a:srgbClr val="000000"/>
-            </a:solidFill>
-            <a:prstDash val="solid"/>
-            <a:round/>
-            <a:headEnd len="sm" w="sm" type="none"/>
-            <a:tailEnd len="sm" w="sm" type="none"/>
-          </a:ln>
-        </p:spPr>
-        <p:txBody>
-          <a:bodyPr anchorCtr="0" anchor="ctr" bIns="91425" lIns="91425" spcFirstLastPara="1" rIns="91425" wrap="square" tIns="91425">
-            <a:noAutofit/>
-          </a:bodyPr>
-          <a:lstStyle/>
-          <a:p>
-            <a:pPr indent="0" lvl="0" marL="0" rtl="0" algn="l">
-              <a:spcBef>
-                <a:spcPts val="0"/>
-              </a:spcBef>
-              <a:spcAft>
-                <a:spcPts val="0"/>
-              </a:spcAft>
-              <a:buNone/>
-            </a:pPr>
-            <a:r>
-              <a:rPr lang="en"/>
-              <a:t>y</a:t>
-            </a:r>
-            <a:endParaRPr/>
-          </a:p>
-        </p:txBody>
-      </p:sp>
-      <p:sp>
-        <p:nvSpPr>
-          <p:cNvPr id="1019" name="Google Shape;1019;p54"/>
-          <p:cNvSpPr/>
-          <p:nvPr/>
-        </p:nvSpPr>
-        <p:spPr>
-          <a:xfrm>
-            <a:off x="3640113" y="3917125"/>
-            <a:ext cx="257700" cy="269100"/>
-          </a:xfrm>
-          <a:prstGeom prst="ellipse">
-            <a:avLst/>
-          </a:prstGeom>
-          <a:noFill/>
-          <a:ln cap="flat" cmpd="sng" w="19050">
-            <a:solidFill>
-              <a:srgbClr val="000000"/>
-            </a:solidFill>
-            <a:prstDash val="solid"/>
-            <a:round/>
-            <a:headEnd len="sm" w="sm" type="none"/>
-            <a:tailEnd len="sm" w="sm" type="none"/>
-          </a:ln>
-        </p:spPr>
-        <p:txBody>
-          <a:bodyPr anchorCtr="0" anchor="ctr" bIns="91425" lIns="91425" spcFirstLastPara="1" rIns="91425" wrap="square" tIns="91425">
-            <a:noAutofit/>
-          </a:bodyPr>
-          <a:lstStyle/>
-          <a:p>
-            <a:pPr indent="0" lvl="0" marL="0" rtl="0" algn="l">
-              <a:spcBef>
-                <a:spcPts val="0"/>
-              </a:spcBef>
-              <a:spcAft>
-                <a:spcPts val="0"/>
-              </a:spcAft>
-              <a:buNone/>
-            </a:pPr>
-            <a:r>
-              <a:rPr lang="en"/>
-              <a:t>z</a:t>
-            </a:r>
-            <a:endParaRPr/>
-          </a:p>
-        </p:txBody>
-      </p:sp>
-      <p:sp>
-        <p:nvSpPr>
-          <p:cNvPr id="1020" name="Google Shape;1020;p54"/>
-          <p:cNvSpPr/>
-          <p:nvPr/>
-        </p:nvSpPr>
-        <p:spPr>
-          <a:xfrm>
-            <a:off x="4178713" y="3917125"/>
-            <a:ext cx="257700" cy="269100"/>
-          </a:xfrm>
-          <a:prstGeom prst="ellipse">
-            <a:avLst/>
-          </a:prstGeom>
-          <a:noFill/>
-          <a:ln cap="flat" cmpd="sng" w="19050">
-            <a:solidFill>
-              <a:srgbClr val="000000"/>
-            </a:solidFill>
-            <a:prstDash val="solid"/>
-            <a:round/>
-            <a:headEnd len="sm" w="sm" type="none"/>
-            <a:tailEnd len="sm" w="sm" type="none"/>
-          </a:ln>
-        </p:spPr>
-        <p:txBody>
-          <a:bodyPr anchorCtr="0" anchor="ctr" bIns="91425" lIns="91425" spcFirstLastPara="1" rIns="91425" wrap="square" tIns="91425">
-            <a:noAutofit/>
-          </a:bodyPr>
-          <a:lstStyle/>
-          <a:p>
-            <a:pPr indent="0" lvl="0" marL="0" rtl="0" algn="l">
-              <a:spcBef>
-                <a:spcPts val="0"/>
-              </a:spcBef>
-              <a:spcAft>
-                <a:spcPts val="0"/>
-              </a:spcAft>
-              <a:buNone/>
-            </a:pPr>
-            <a:r>
-              <a:rPr lang="en"/>
-              <a:t>z</a:t>
-            </a:r>
-            <a:endParaRPr/>
-          </a:p>
-        </p:txBody>
-      </p:sp>
-      <p:sp>
-        <p:nvSpPr>
-          <p:cNvPr id="1021" name="Google Shape;1021;p54"/>
-          <p:cNvSpPr/>
-          <p:nvPr/>
-        </p:nvSpPr>
-        <p:spPr>
-          <a:xfrm>
-            <a:off x="4717313" y="3917125"/>
-            <a:ext cx="257700" cy="269100"/>
-          </a:xfrm>
-          <a:prstGeom prst="ellipse">
-            <a:avLst/>
-          </a:prstGeom>
-          <a:noFill/>
-          <a:ln cap="flat" cmpd="sng" w="19050">
-            <a:solidFill>
-              <a:srgbClr val="000000"/>
-            </a:solidFill>
-            <a:prstDash val="solid"/>
-            <a:round/>
-            <a:headEnd len="sm" w="sm" type="none"/>
-            <a:tailEnd len="sm" w="sm" type="none"/>
-          </a:ln>
-        </p:spPr>
-        <p:txBody>
-          <a:bodyPr anchorCtr="0" anchor="ctr" bIns="91425" lIns="91425" spcFirstLastPara="1" rIns="91425" wrap="square" tIns="91425">
-            <a:noAutofit/>
-          </a:bodyPr>
-          <a:lstStyle/>
-          <a:p>
-            <a:pPr indent="0" lvl="0" marL="0" rtl="0" algn="l">
-              <a:spcBef>
-                <a:spcPts val="0"/>
-              </a:spcBef>
-              <a:spcAft>
-                <a:spcPts val="0"/>
-              </a:spcAft>
-              <a:buNone/>
-            </a:pPr>
-            <a:r>
-              <a:rPr lang="en"/>
-              <a:t>z</a:t>
-            </a:r>
-            <a:endParaRPr/>
-          </a:p>
-        </p:txBody>
-      </p:sp>
-      <p:sp>
-        <p:nvSpPr>
-          <p:cNvPr id="1022" name="Google Shape;1022;p54"/>
-          <p:cNvSpPr/>
-          <p:nvPr/>
-        </p:nvSpPr>
-        <p:spPr>
-          <a:xfrm>
-            <a:off x="5255913" y="3917125"/>
-            <a:ext cx="257700" cy="269100"/>
-          </a:xfrm>
-          <a:prstGeom prst="ellipse">
-            <a:avLst/>
-          </a:prstGeom>
-          <a:noFill/>
-          <a:ln cap="flat" cmpd="sng" w="19050">
-            <a:solidFill>
-              <a:srgbClr val="000000"/>
-            </a:solidFill>
-            <a:prstDash val="solid"/>
-            <a:round/>
-            <a:headEnd len="sm" w="sm" type="none"/>
-            <a:tailEnd len="sm" w="sm" type="none"/>
-          </a:ln>
-        </p:spPr>
-        <p:txBody>
-          <a:bodyPr anchorCtr="0" anchor="ctr" bIns="91425" lIns="91425" spcFirstLastPara="1" rIns="91425" wrap="square" tIns="91425">
-            <a:noAutofit/>
-          </a:bodyPr>
-          <a:lstStyle/>
-          <a:p>
-            <a:pPr indent="0" lvl="0" marL="0" rtl="0" algn="l">
-              <a:spcBef>
-                <a:spcPts val="0"/>
-              </a:spcBef>
-              <a:spcAft>
-                <a:spcPts val="0"/>
-              </a:spcAft>
-              <a:buNone/>
-            </a:pPr>
-            <a:r>
-              <a:rPr lang="en"/>
-              <a:t>z</a:t>
-            </a:r>
-            <a:endParaRPr/>
-          </a:p>
-        </p:txBody>
-      </p:sp>
-      <p:sp>
-        <p:nvSpPr>
-          <p:cNvPr id="1023" name="Google Shape;1023;p54"/>
-          <p:cNvSpPr/>
-          <p:nvPr/>
-        </p:nvSpPr>
-        <p:spPr>
-          <a:xfrm>
-            <a:off x="5794513" y="3917125"/>
-            <a:ext cx="257700" cy="269100"/>
-          </a:xfrm>
-          <a:prstGeom prst="ellipse">
-            <a:avLst/>
-          </a:prstGeom>
-          <a:noFill/>
-          <a:ln cap="flat" cmpd="sng" w="19050">
-            <a:solidFill>
-              <a:srgbClr val="000000"/>
-            </a:solidFill>
-            <a:prstDash val="solid"/>
-            <a:round/>
-            <a:headEnd len="sm" w="sm" type="none"/>
-            <a:tailEnd len="sm" w="sm" type="none"/>
-          </a:ln>
-        </p:spPr>
-        <p:txBody>
-          <a:bodyPr anchorCtr="0" anchor="ctr" bIns="91425" lIns="91425" spcFirstLastPara="1" rIns="91425" wrap="square" tIns="91425">
-            <a:noAutofit/>
-          </a:bodyPr>
-          <a:lstStyle/>
-          <a:p>
-            <a:pPr indent="0" lvl="0" marL="0" rtl="0" algn="l">
-              <a:spcBef>
-                <a:spcPts val="0"/>
-              </a:spcBef>
-              <a:spcAft>
-                <a:spcPts val="0"/>
-              </a:spcAft>
-              <a:buNone/>
-            </a:pPr>
-            <a:r>
-              <a:rPr lang="en"/>
-              <a:t>z</a:t>
-            </a:r>
-            <a:endParaRPr/>
-          </a:p>
-        </p:txBody>
-      </p:sp>
-      <p:sp>
-        <p:nvSpPr>
-          <p:cNvPr id="1024" name="Google Shape;1024;p54"/>
-          <p:cNvSpPr/>
-          <p:nvPr/>
-        </p:nvSpPr>
-        <p:spPr>
-          <a:xfrm>
-            <a:off x="6333113" y="3917125"/>
-            <a:ext cx="257700" cy="269100"/>
-          </a:xfrm>
-          <a:prstGeom prst="ellipse">
-            <a:avLst/>
-          </a:prstGeom>
-          <a:noFill/>
-          <a:ln cap="flat" cmpd="sng" w="19050">
-            <a:solidFill>
-              <a:srgbClr val="000000"/>
-            </a:solidFill>
-            <a:prstDash val="solid"/>
-            <a:round/>
-            <a:headEnd len="sm" w="sm" type="none"/>
-            <a:tailEnd len="sm" w="sm" type="none"/>
-          </a:ln>
-        </p:spPr>
-        <p:txBody>
-          <a:bodyPr anchorCtr="0" anchor="ctr" bIns="91425" lIns="91425" spcFirstLastPara="1" rIns="91425" wrap="square" tIns="91425">
-            <a:noAutofit/>
-          </a:bodyPr>
-          <a:lstStyle/>
-          <a:p>
-            <a:pPr indent="0" lvl="0" marL="0" rtl="0" algn="l">
-              <a:spcBef>
-                <a:spcPts val="0"/>
-              </a:spcBef>
-              <a:spcAft>
-                <a:spcPts val="0"/>
-              </a:spcAft>
-              <a:buNone/>
-            </a:pPr>
-            <a:r>
-              <a:rPr lang="en"/>
-              <a:t>z</a:t>
-            </a:r>
-            <a:endParaRPr/>
-          </a:p>
-        </p:txBody>
-      </p:sp>
-      <p:sp>
-        <p:nvSpPr>
-          <p:cNvPr id="1025" name="Google Shape;1025;p54"/>
-          <p:cNvSpPr/>
-          <p:nvPr/>
-        </p:nvSpPr>
-        <p:spPr>
-          <a:xfrm>
-            <a:off x="6871713" y="3917125"/>
-            <a:ext cx="257700" cy="269100"/>
-          </a:xfrm>
-          <a:prstGeom prst="ellipse">
-            <a:avLst/>
-          </a:prstGeom>
-          <a:noFill/>
-          <a:ln cap="flat" cmpd="sng" w="19050">
-            <a:solidFill>
-              <a:srgbClr val="000000"/>
-            </a:solidFill>
-            <a:prstDash val="solid"/>
-            <a:round/>
-            <a:headEnd len="sm" w="sm" type="none"/>
-            <a:tailEnd len="sm" w="sm" type="none"/>
-          </a:ln>
-        </p:spPr>
-        <p:txBody>
-          <a:bodyPr anchorCtr="0" anchor="ctr" bIns="91425" lIns="91425" spcFirstLastPara="1" rIns="91425" wrap="square" tIns="91425">
-            <a:noAutofit/>
-          </a:bodyPr>
-          <a:lstStyle/>
-          <a:p>
-            <a:pPr indent="0" lvl="0" marL="0" rtl="0" algn="l">
-              <a:spcBef>
-                <a:spcPts val="0"/>
-              </a:spcBef>
-              <a:spcAft>
-                <a:spcPts val="0"/>
-              </a:spcAft>
-              <a:buNone/>
-            </a:pPr>
-            <a:r>
-              <a:rPr lang="en"/>
-              <a:t>z</a:t>
-            </a:r>
-            <a:endParaRPr/>
-          </a:p>
-        </p:txBody>
-      </p:sp>
-      <p:sp>
-        <p:nvSpPr>
-          <p:cNvPr id="1026" name="Google Shape;1026;p54"/>
-          <p:cNvSpPr/>
-          <p:nvPr/>
-        </p:nvSpPr>
-        <p:spPr>
-          <a:xfrm>
-            <a:off x="7410313" y="3917125"/>
-            <a:ext cx="257700" cy="269100"/>
-          </a:xfrm>
-          <a:prstGeom prst="ellipse">
-            <a:avLst/>
-          </a:prstGeom>
-          <a:noFill/>
-          <a:ln cap="flat" cmpd="sng" w="19050">
-            <a:solidFill>
-              <a:srgbClr val="000000"/>
-            </a:solidFill>
-            <a:prstDash val="solid"/>
-            <a:round/>
-            <a:headEnd len="sm" w="sm" type="none"/>
-            <a:tailEnd len="sm" w="sm" type="none"/>
-          </a:ln>
-        </p:spPr>
-        <p:txBody>
-          <a:bodyPr anchorCtr="0" anchor="ctr" bIns="91425" lIns="91425" spcFirstLastPara="1" rIns="91425" wrap="square" tIns="91425">
-            <a:noAutofit/>
-          </a:bodyPr>
-          <a:lstStyle/>
-          <a:p>
-            <a:pPr indent="0" lvl="0" marL="0" rtl="0" algn="l">
-              <a:spcBef>
-                <a:spcPts val="0"/>
-              </a:spcBef>
-              <a:spcAft>
-                <a:spcPts val="0"/>
-              </a:spcAft>
-              <a:buNone/>
-            </a:pPr>
-            <a:r>
-              <a:rPr lang="en"/>
-              <a:t>z</a:t>
-            </a:r>
-            <a:endParaRPr/>
-          </a:p>
-        </p:txBody>
-      </p:sp>
-      <p:sp>
-        <p:nvSpPr>
-          <p:cNvPr id="1027" name="Google Shape;1027;p54"/>
-          <p:cNvSpPr/>
-          <p:nvPr/>
-        </p:nvSpPr>
-        <p:spPr>
-          <a:xfrm>
-            <a:off x="7948913" y="3917125"/>
-            <a:ext cx="257700" cy="269100"/>
-          </a:xfrm>
-          <a:prstGeom prst="ellipse">
-            <a:avLst/>
-          </a:prstGeom>
-          <a:noFill/>
-          <a:ln cap="flat" cmpd="sng" w="19050">
-            <a:solidFill>
-              <a:srgbClr val="000000"/>
-            </a:solidFill>
-            <a:prstDash val="solid"/>
-            <a:round/>
-            <a:headEnd len="sm" w="sm" type="none"/>
-            <a:tailEnd len="sm" w="sm" type="none"/>
-          </a:ln>
-        </p:spPr>
-        <p:txBody>
-          <a:bodyPr anchorCtr="0" anchor="ctr" bIns="91425" lIns="91425" spcFirstLastPara="1" rIns="91425" wrap="square" tIns="91425">
-            <a:noAutofit/>
-          </a:bodyPr>
-          <a:lstStyle/>
-          <a:p>
-            <a:pPr indent="0" lvl="0" marL="0" rtl="0" algn="l">
-              <a:spcBef>
-                <a:spcPts val="0"/>
-              </a:spcBef>
-              <a:spcAft>
-                <a:spcPts val="0"/>
-              </a:spcAft>
-              <a:buNone/>
-            </a:pPr>
-            <a:r>
-              <a:rPr lang="en"/>
-              <a:t>z</a:t>
-            </a:r>
-            <a:endParaRPr/>
-          </a:p>
-        </p:txBody>
-      </p:sp>
-      <p:sp>
-        <p:nvSpPr>
-          <p:cNvPr id="1028" name="Google Shape;1028;p54"/>
+          <p:cNvPr id="998" name="Google Shape;998;p54"/>
           <p:cNvSpPr txBox="1"/>
           <p:nvPr/>
         </p:nvSpPr>
@@ -47382,6 +46294,1094 @@
               <a:cs typeface="Open Sans"/>
               <a:sym typeface="Open Sans"/>
             </a:endParaRPr>
+          </a:p>
+        </p:txBody>
+      </p:sp>
+      <p:cxnSp>
+        <p:nvCxnSpPr>
+          <p:cNvPr id="999" name="Google Shape;999;p54"/>
+          <p:cNvCxnSpPr/>
+          <p:nvPr/>
+        </p:nvCxnSpPr>
+        <p:spPr>
+          <a:xfrm flipH="1" rot="10800000">
+            <a:off x="784650" y="4248200"/>
+            <a:ext cx="7574700" cy="35100"/>
+          </a:xfrm>
+          <a:prstGeom prst="straightConnector1">
+            <a:avLst/>
+          </a:prstGeom>
+          <a:noFill/>
+          <a:ln cap="flat" cmpd="sng" w="38100">
+            <a:solidFill>
+              <a:srgbClr val="000000"/>
+            </a:solidFill>
+            <a:prstDash val="solid"/>
+            <a:round/>
+            <a:headEnd len="med" w="med" type="none"/>
+            <a:tailEnd len="med" w="med" type="none"/>
+          </a:ln>
+        </p:spPr>
+      </p:cxnSp>
+      <p:cxnSp>
+        <p:nvCxnSpPr>
+          <p:cNvPr id="1000" name="Google Shape;1000;p54"/>
+          <p:cNvCxnSpPr/>
+          <p:nvPr/>
+        </p:nvCxnSpPr>
+        <p:spPr>
+          <a:xfrm flipH="1" rot="10800000">
+            <a:off x="805625" y="3964050"/>
+            <a:ext cx="2100" cy="310500"/>
+          </a:xfrm>
+          <a:prstGeom prst="straightConnector1">
+            <a:avLst/>
+          </a:prstGeom>
+          <a:noFill/>
+          <a:ln cap="flat" cmpd="sng" w="38100">
+            <a:solidFill>
+              <a:srgbClr val="000000"/>
+            </a:solidFill>
+            <a:prstDash val="solid"/>
+            <a:round/>
+            <a:headEnd len="med" w="med" type="none"/>
+            <a:tailEnd len="med" w="med" type="none"/>
+          </a:ln>
+        </p:spPr>
+      </p:cxnSp>
+      <p:cxnSp>
+        <p:nvCxnSpPr>
+          <p:cNvPr id="1001" name="Google Shape;1001;p54"/>
+          <p:cNvCxnSpPr/>
+          <p:nvPr/>
+        </p:nvCxnSpPr>
+        <p:spPr>
+          <a:xfrm flipH="1" rot="10800000">
+            <a:off x="1344225" y="3964050"/>
+            <a:ext cx="2100" cy="310500"/>
+          </a:xfrm>
+          <a:prstGeom prst="straightConnector1">
+            <a:avLst/>
+          </a:prstGeom>
+          <a:noFill/>
+          <a:ln cap="flat" cmpd="sng" w="38100">
+            <a:solidFill>
+              <a:srgbClr val="000000"/>
+            </a:solidFill>
+            <a:prstDash val="solid"/>
+            <a:round/>
+            <a:headEnd len="med" w="med" type="none"/>
+            <a:tailEnd len="med" w="med" type="none"/>
+          </a:ln>
+        </p:spPr>
+      </p:cxnSp>
+      <p:cxnSp>
+        <p:nvCxnSpPr>
+          <p:cNvPr id="1002" name="Google Shape;1002;p54"/>
+          <p:cNvCxnSpPr/>
+          <p:nvPr/>
+        </p:nvCxnSpPr>
+        <p:spPr>
+          <a:xfrm flipH="1" rot="10800000">
+            <a:off x="1882825" y="3964050"/>
+            <a:ext cx="2100" cy="310500"/>
+          </a:xfrm>
+          <a:prstGeom prst="straightConnector1">
+            <a:avLst/>
+          </a:prstGeom>
+          <a:noFill/>
+          <a:ln cap="flat" cmpd="sng" w="38100">
+            <a:solidFill>
+              <a:srgbClr val="000000"/>
+            </a:solidFill>
+            <a:prstDash val="solid"/>
+            <a:round/>
+            <a:headEnd len="med" w="med" type="none"/>
+            <a:tailEnd len="med" w="med" type="none"/>
+          </a:ln>
+        </p:spPr>
+      </p:cxnSp>
+      <p:cxnSp>
+        <p:nvCxnSpPr>
+          <p:cNvPr id="1003" name="Google Shape;1003;p54"/>
+          <p:cNvCxnSpPr/>
+          <p:nvPr/>
+        </p:nvCxnSpPr>
+        <p:spPr>
+          <a:xfrm flipH="1" rot="10800000">
+            <a:off x="2421425" y="3964050"/>
+            <a:ext cx="2100" cy="310500"/>
+          </a:xfrm>
+          <a:prstGeom prst="straightConnector1">
+            <a:avLst/>
+          </a:prstGeom>
+          <a:noFill/>
+          <a:ln cap="flat" cmpd="sng" w="38100">
+            <a:solidFill>
+              <a:srgbClr val="000000"/>
+            </a:solidFill>
+            <a:prstDash val="solid"/>
+            <a:round/>
+            <a:headEnd len="med" w="med" type="none"/>
+            <a:tailEnd len="med" w="med" type="none"/>
+          </a:ln>
+        </p:spPr>
+      </p:cxnSp>
+      <p:cxnSp>
+        <p:nvCxnSpPr>
+          <p:cNvPr id="1004" name="Google Shape;1004;p54"/>
+          <p:cNvCxnSpPr/>
+          <p:nvPr/>
+        </p:nvCxnSpPr>
+        <p:spPr>
+          <a:xfrm flipH="1" rot="10800000">
+            <a:off x="2960025" y="3964050"/>
+            <a:ext cx="2100" cy="310500"/>
+          </a:xfrm>
+          <a:prstGeom prst="straightConnector1">
+            <a:avLst/>
+          </a:prstGeom>
+          <a:noFill/>
+          <a:ln cap="flat" cmpd="sng" w="38100">
+            <a:solidFill>
+              <a:srgbClr val="000000"/>
+            </a:solidFill>
+            <a:prstDash val="solid"/>
+            <a:round/>
+            <a:headEnd len="med" w="med" type="none"/>
+            <a:tailEnd len="med" w="med" type="none"/>
+          </a:ln>
+        </p:spPr>
+      </p:cxnSp>
+      <p:cxnSp>
+        <p:nvCxnSpPr>
+          <p:cNvPr id="1005" name="Google Shape;1005;p54"/>
+          <p:cNvCxnSpPr/>
+          <p:nvPr/>
+        </p:nvCxnSpPr>
+        <p:spPr>
+          <a:xfrm flipH="1" rot="10800000">
+            <a:off x="3498625" y="3964050"/>
+            <a:ext cx="2100" cy="310500"/>
+          </a:xfrm>
+          <a:prstGeom prst="straightConnector1">
+            <a:avLst/>
+          </a:prstGeom>
+          <a:noFill/>
+          <a:ln cap="flat" cmpd="sng" w="38100">
+            <a:solidFill>
+              <a:srgbClr val="000000"/>
+            </a:solidFill>
+            <a:prstDash val="solid"/>
+            <a:round/>
+            <a:headEnd len="med" w="med" type="none"/>
+            <a:tailEnd len="med" w="med" type="none"/>
+          </a:ln>
+        </p:spPr>
+      </p:cxnSp>
+      <p:cxnSp>
+        <p:nvCxnSpPr>
+          <p:cNvPr id="1006" name="Google Shape;1006;p54"/>
+          <p:cNvCxnSpPr/>
+          <p:nvPr/>
+        </p:nvCxnSpPr>
+        <p:spPr>
+          <a:xfrm flipH="1" rot="10800000">
+            <a:off x="4037225" y="3964050"/>
+            <a:ext cx="2100" cy="310500"/>
+          </a:xfrm>
+          <a:prstGeom prst="straightConnector1">
+            <a:avLst/>
+          </a:prstGeom>
+          <a:noFill/>
+          <a:ln cap="flat" cmpd="sng" w="38100">
+            <a:solidFill>
+              <a:srgbClr val="000000"/>
+            </a:solidFill>
+            <a:prstDash val="solid"/>
+            <a:round/>
+            <a:headEnd len="med" w="med" type="none"/>
+            <a:tailEnd len="med" w="med" type="none"/>
+          </a:ln>
+        </p:spPr>
+      </p:cxnSp>
+      <p:cxnSp>
+        <p:nvCxnSpPr>
+          <p:cNvPr id="1007" name="Google Shape;1007;p54"/>
+          <p:cNvCxnSpPr/>
+          <p:nvPr/>
+        </p:nvCxnSpPr>
+        <p:spPr>
+          <a:xfrm flipH="1" rot="10800000">
+            <a:off x="4575825" y="3964050"/>
+            <a:ext cx="2100" cy="310500"/>
+          </a:xfrm>
+          <a:prstGeom prst="straightConnector1">
+            <a:avLst/>
+          </a:prstGeom>
+          <a:noFill/>
+          <a:ln cap="flat" cmpd="sng" w="38100">
+            <a:solidFill>
+              <a:srgbClr val="000000"/>
+            </a:solidFill>
+            <a:prstDash val="solid"/>
+            <a:round/>
+            <a:headEnd len="med" w="med" type="none"/>
+            <a:tailEnd len="med" w="med" type="none"/>
+          </a:ln>
+        </p:spPr>
+      </p:cxnSp>
+      <p:cxnSp>
+        <p:nvCxnSpPr>
+          <p:cNvPr id="1008" name="Google Shape;1008;p54"/>
+          <p:cNvCxnSpPr/>
+          <p:nvPr/>
+        </p:nvCxnSpPr>
+        <p:spPr>
+          <a:xfrm flipH="1" rot="10800000">
+            <a:off x="5114425" y="3964050"/>
+            <a:ext cx="2100" cy="310500"/>
+          </a:xfrm>
+          <a:prstGeom prst="straightConnector1">
+            <a:avLst/>
+          </a:prstGeom>
+          <a:noFill/>
+          <a:ln cap="flat" cmpd="sng" w="38100">
+            <a:solidFill>
+              <a:srgbClr val="000000"/>
+            </a:solidFill>
+            <a:prstDash val="solid"/>
+            <a:round/>
+            <a:headEnd len="med" w="med" type="none"/>
+            <a:tailEnd len="med" w="med" type="none"/>
+          </a:ln>
+        </p:spPr>
+      </p:cxnSp>
+      <p:cxnSp>
+        <p:nvCxnSpPr>
+          <p:cNvPr id="1009" name="Google Shape;1009;p54"/>
+          <p:cNvCxnSpPr/>
+          <p:nvPr/>
+        </p:nvCxnSpPr>
+        <p:spPr>
+          <a:xfrm flipH="1" rot="10800000">
+            <a:off x="5653025" y="3964050"/>
+            <a:ext cx="2100" cy="310500"/>
+          </a:xfrm>
+          <a:prstGeom prst="straightConnector1">
+            <a:avLst/>
+          </a:prstGeom>
+          <a:noFill/>
+          <a:ln cap="flat" cmpd="sng" w="38100">
+            <a:solidFill>
+              <a:srgbClr val="000000"/>
+            </a:solidFill>
+            <a:prstDash val="solid"/>
+            <a:round/>
+            <a:headEnd len="med" w="med" type="none"/>
+            <a:tailEnd len="med" w="med" type="none"/>
+          </a:ln>
+        </p:spPr>
+      </p:cxnSp>
+      <p:cxnSp>
+        <p:nvCxnSpPr>
+          <p:cNvPr id="1010" name="Google Shape;1010;p54"/>
+          <p:cNvCxnSpPr/>
+          <p:nvPr/>
+        </p:nvCxnSpPr>
+        <p:spPr>
+          <a:xfrm flipH="1" rot="10800000">
+            <a:off x="6191625" y="3964050"/>
+            <a:ext cx="2100" cy="310500"/>
+          </a:xfrm>
+          <a:prstGeom prst="straightConnector1">
+            <a:avLst/>
+          </a:prstGeom>
+          <a:noFill/>
+          <a:ln cap="flat" cmpd="sng" w="38100">
+            <a:solidFill>
+              <a:srgbClr val="000000"/>
+            </a:solidFill>
+            <a:prstDash val="solid"/>
+            <a:round/>
+            <a:headEnd len="med" w="med" type="none"/>
+            <a:tailEnd len="med" w="med" type="none"/>
+          </a:ln>
+        </p:spPr>
+      </p:cxnSp>
+      <p:cxnSp>
+        <p:nvCxnSpPr>
+          <p:cNvPr id="1011" name="Google Shape;1011;p54"/>
+          <p:cNvCxnSpPr/>
+          <p:nvPr/>
+        </p:nvCxnSpPr>
+        <p:spPr>
+          <a:xfrm flipH="1" rot="10800000">
+            <a:off x="6730225" y="3964050"/>
+            <a:ext cx="2100" cy="310500"/>
+          </a:xfrm>
+          <a:prstGeom prst="straightConnector1">
+            <a:avLst/>
+          </a:prstGeom>
+          <a:noFill/>
+          <a:ln cap="flat" cmpd="sng" w="38100">
+            <a:solidFill>
+              <a:srgbClr val="000000"/>
+            </a:solidFill>
+            <a:prstDash val="solid"/>
+            <a:round/>
+            <a:headEnd len="med" w="med" type="none"/>
+            <a:tailEnd len="med" w="med" type="none"/>
+          </a:ln>
+        </p:spPr>
+      </p:cxnSp>
+      <p:cxnSp>
+        <p:nvCxnSpPr>
+          <p:cNvPr id="1012" name="Google Shape;1012;p54"/>
+          <p:cNvCxnSpPr/>
+          <p:nvPr/>
+        </p:nvCxnSpPr>
+        <p:spPr>
+          <a:xfrm flipH="1" rot="10800000">
+            <a:off x="7268825" y="3964050"/>
+            <a:ext cx="2100" cy="310500"/>
+          </a:xfrm>
+          <a:prstGeom prst="straightConnector1">
+            <a:avLst/>
+          </a:prstGeom>
+          <a:noFill/>
+          <a:ln cap="flat" cmpd="sng" w="38100">
+            <a:solidFill>
+              <a:srgbClr val="000000"/>
+            </a:solidFill>
+            <a:prstDash val="solid"/>
+            <a:round/>
+            <a:headEnd len="med" w="med" type="none"/>
+            <a:tailEnd len="med" w="med" type="none"/>
+          </a:ln>
+        </p:spPr>
+      </p:cxnSp>
+      <p:cxnSp>
+        <p:nvCxnSpPr>
+          <p:cNvPr id="1013" name="Google Shape;1013;p54"/>
+          <p:cNvCxnSpPr/>
+          <p:nvPr/>
+        </p:nvCxnSpPr>
+        <p:spPr>
+          <a:xfrm flipH="1" rot="10800000">
+            <a:off x="7807425" y="3964050"/>
+            <a:ext cx="2100" cy="310500"/>
+          </a:xfrm>
+          <a:prstGeom prst="straightConnector1">
+            <a:avLst/>
+          </a:prstGeom>
+          <a:noFill/>
+          <a:ln cap="flat" cmpd="sng" w="38100">
+            <a:solidFill>
+              <a:srgbClr val="000000"/>
+            </a:solidFill>
+            <a:prstDash val="solid"/>
+            <a:round/>
+            <a:headEnd len="med" w="med" type="none"/>
+            <a:tailEnd len="med" w="med" type="none"/>
+          </a:ln>
+        </p:spPr>
+      </p:cxnSp>
+      <p:cxnSp>
+        <p:nvCxnSpPr>
+          <p:cNvPr id="1014" name="Google Shape;1014;p54"/>
+          <p:cNvCxnSpPr/>
+          <p:nvPr/>
+        </p:nvCxnSpPr>
+        <p:spPr>
+          <a:xfrm flipH="1" rot="10800000">
+            <a:off x="8346025" y="3964050"/>
+            <a:ext cx="2100" cy="310500"/>
+          </a:xfrm>
+          <a:prstGeom prst="straightConnector1">
+            <a:avLst/>
+          </a:prstGeom>
+          <a:noFill/>
+          <a:ln cap="flat" cmpd="sng" w="38100">
+            <a:solidFill>
+              <a:srgbClr val="000000"/>
+            </a:solidFill>
+            <a:prstDash val="solid"/>
+            <a:round/>
+            <a:headEnd len="med" w="med" type="none"/>
+            <a:tailEnd len="med" w="med" type="none"/>
+          </a:ln>
+        </p:spPr>
+      </p:cxnSp>
+      <p:sp>
+        <p:nvSpPr>
+          <p:cNvPr id="1015" name="Google Shape;1015;p54"/>
+          <p:cNvSpPr/>
+          <p:nvPr/>
+        </p:nvSpPr>
+        <p:spPr>
+          <a:xfrm>
+            <a:off x="935513" y="3917125"/>
+            <a:ext cx="257700" cy="269100"/>
+          </a:xfrm>
+          <a:prstGeom prst="ellipse">
+            <a:avLst/>
+          </a:prstGeom>
+          <a:noFill/>
+          <a:ln cap="flat" cmpd="sng" w="19050">
+            <a:solidFill>
+              <a:srgbClr val="000000"/>
+            </a:solidFill>
+            <a:prstDash val="solid"/>
+            <a:round/>
+            <a:headEnd len="sm" w="sm" type="none"/>
+            <a:tailEnd len="sm" w="sm" type="none"/>
+          </a:ln>
+        </p:spPr>
+        <p:txBody>
+          <a:bodyPr anchorCtr="0" anchor="ctr" bIns="91425" lIns="91425" spcFirstLastPara="1" rIns="91425" wrap="square" tIns="91425">
+            <a:noAutofit/>
+          </a:bodyPr>
+          <a:lstStyle/>
+          <a:p>
+            <a:pPr indent="0" lvl="0" marL="0" rtl="0" algn="l">
+              <a:spcBef>
+                <a:spcPts val="0"/>
+              </a:spcBef>
+              <a:spcAft>
+                <a:spcPts val="0"/>
+              </a:spcAft>
+              <a:buNone/>
+            </a:pPr>
+            <a:r>
+              <a:rPr lang="en"/>
+              <a:t>z</a:t>
+            </a:r>
+            <a:endParaRPr/>
+          </a:p>
+        </p:txBody>
+      </p:sp>
+      <p:sp>
+        <p:nvSpPr>
+          <p:cNvPr id="1016" name="Google Shape;1016;p54"/>
+          <p:cNvSpPr/>
+          <p:nvPr/>
+        </p:nvSpPr>
+        <p:spPr>
+          <a:xfrm>
+            <a:off x="1485713" y="3917125"/>
+            <a:ext cx="257700" cy="269100"/>
+          </a:xfrm>
+          <a:prstGeom prst="ellipse">
+            <a:avLst/>
+          </a:prstGeom>
+          <a:noFill/>
+          <a:ln cap="flat" cmpd="sng" w="19050">
+            <a:solidFill>
+              <a:srgbClr val="000000"/>
+            </a:solidFill>
+            <a:prstDash val="solid"/>
+            <a:round/>
+            <a:headEnd len="sm" w="sm" type="none"/>
+            <a:tailEnd len="sm" w="sm" type="none"/>
+          </a:ln>
+        </p:spPr>
+        <p:txBody>
+          <a:bodyPr anchorCtr="0" anchor="ctr" bIns="91425" lIns="91425" spcFirstLastPara="1" rIns="91425" wrap="square" tIns="91425">
+            <a:noAutofit/>
+          </a:bodyPr>
+          <a:lstStyle/>
+          <a:p>
+            <a:pPr indent="0" lvl="0" marL="0" rtl="0" algn="l">
+              <a:spcBef>
+                <a:spcPts val="0"/>
+              </a:spcBef>
+              <a:spcAft>
+                <a:spcPts val="0"/>
+              </a:spcAft>
+              <a:buNone/>
+            </a:pPr>
+            <a:r>
+              <a:rPr lang="en"/>
+              <a:t>y</a:t>
+            </a:r>
+            <a:endParaRPr/>
+          </a:p>
+        </p:txBody>
+      </p:sp>
+      <p:sp>
+        <p:nvSpPr>
+          <p:cNvPr id="1017" name="Google Shape;1017;p54"/>
+          <p:cNvSpPr/>
+          <p:nvPr/>
+        </p:nvSpPr>
+        <p:spPr>
+          <a:xfrm>
+            <a:off x="2024313" y="3917125"/>
+            <a:ext cx="257700" cy="269100"/>
+          </a:xfrm>
+          <a:prstGeom prst="ellipse">
+            <a:avLst/>
+          </a:prstGeom>
+          <a:noFill/>
+          <a:ln cap="flat" cmpd="sng" w="19050">
+            <a:solidFill>
+              <a:srgbClr val="000000"/>
+            </a:solidFill>
+            <a:prstDash val="solid"/>
+            <a:round/>
+            <a:headEnd len="sm" w="sm" type="none"/>
+            <a:tailEnd len="sm" w="sm" type="none"/>
+          </a:ln>
+        </p:spPr>
+        <p:txBody>
+          <a:bodyPr anchorCtr="0" anchor="ctr" bIns="91425" lIns="91425" spcFirstLastPara="1" rIns="91425" wrap="square" tIns="91425">
+            <a:noAutofit/>
+          </a:bodyPr>
+          <a:lstStyle/>
+          <a:p>
+            <a:pPr indent="0" lvl="0" marL="0" rtl="0" algn="l">
+              <a:spcBef>
+                <a:spcPts val="0"/>
+              </a:spcBef>
+              <a:spcAft>
+                <a:spcPts val="0"/>
+              </a:spcAft>
+              <a:buNone/>
+            </a:pPr>
+            <a:r>
+              <a:rPr lang="en"/>
+              <a:t>y</a:t>
+            </a:r>
+            <a:endParaRPr/>
+          </a:p>
+        </p:txBody>
+      </p:sp>
+      <p:sp>
+        <p:nvSpPr>
+          <p:cNvPr id="1018" name="Google Shape;1018;p54"/>
+          <p:cNvSpPr/>
+          <p:nvPr/>
+        </p:nvSpPr>
+        <p:spPr>
+          <a:xfrm>
+            <a:off x="2574513" y="3917125"/>
+            <a:ext cx="257700" cy="269100"/>
+          </a:xfrm>
+          <a:prstGeom prst="ellipse">
+            <a:avLst/>
+          </a:prstGeom>
+          <a:noFill/>
+          <a:ln cap="flat" cmpd="sng" w="19050">
+            <a:solidFill>
+              <a:srgbClr val="000000"/>
+            </a:solidFill>
+            <a:prstDash val="solid"/>
+            <a:round/>
+            <a:headEnd len="sm" w="sm" type="none"/>
+            <a:tailEnd len="sm" w="sm" type="none"/>
+          </a:ln>
+        </p:spPr>
+        <p:txBody>
+          <a:bodyPr anchorCtr="0" anchor="ctr" bIns="91425" lIns="91425" spcFirstLastPara="1" rIns="91425" wrap="square" tIns="91425">
+            <a:noAutofit/>
+          </a:bodyPr>
+          <a:lstStyle/>
+          <a:p>
+            <a:pPr indent="0" lvl="0" marL="0" rtl="0" algn="l">
+              <a:spcBef>
+                <a:spcPts val="0"/>
+              </a:spcBef>
+              <a:spcAft>
+                <a:spcPts val="0"/>
+              </a:spcAft>
+              <a:buNone/>
+            </a:pPr>
+            <a:r>
+              <a:rPr lang="en"/>
+              <a:t>y</a:t>
+            </a:r>
+            <a:endParaRPr/>
+          </a:p>
+        </p:txBody>
+      </p:sp>
+      <p:sp>
+        <p:nvSpPr>
+          <p:cNvPr id="1019" name="Google Shape;1019;p54"/>
+          <p:cNvSpPr/>
+          <p:nvPr/>
+        </p:nvSpPr>
+        <p:spPr>
+          <a:xfrm>
+            <a:off x="3113113" y="3917125"/>
+            <a:ext cx="257700" cy="269100"/>
+          </a:xfrm>
+          <a:prstGeom prst="ellipse">
+            <a:avLst/>
+          </a:prstGeom>
+          <a:noFill/>
+          <a:ln cap="flat" cmpd="sng" w="19050">
+            <a:solidFill>
+              <a:srgbClr val="000000"/>
+            </a:solidFill>
+            <a:prstDash val="solid"/>
+            <a:round/>
+            <a:headEnd len="sm" w="sm" type="none"/>
+            <a:tailEnd len="sm" w="sm" type="none"/>
+          </a:ln>
+        </p:spPr>
+        <p:txBody>
+          <a:bodyPr anchorCtr="0" anchor="ctr" bIns="91425" lIns="91425" spcFirstLastPara="1" rIns="91425" wrap="square" tIns="91425">
+            <a:noAutofit/>
+          </a:bodyPr>
+          <a:lstStyle/>
+          <a:p>
+            <a:pPr indent="0" lvl="0" marL="0" rtl="0" algn="l">
+              <a:spcBef>
+                <a:spcPts val="0"/>
+              </a:spcBef>
+              <a:spcAft>
+                <a:spcPts val="0"/>
+              </a:spcAft>
+              <a:buNone/>
+            </a:pPr>
+            <a:r>
+              <a:rPr lang="en"/>
+              <a:t>y</a:t>
+            </a:r>
+            <a:endParaRPr/>
+          </a:p>
+        </p:txBody>
+      </p:sp>
+      <p:sp>
+        <p:nvSpPr>
+          <p:cNvPr id="1020" name="Google Shape;1020;p54"/>
+          <p:cNvSpPr/>
+          <p:nvPr/>
+        </p:nvSpPr>
+        <p:spPr>
+          <a:xfrm>
+            <a:off x="3640113" y="3917125"/>
+            <a:ext cx="257700" cy="269100"/>
+          </a:xfrm>
+          <a:prstGeom prst="ellipse">
+            <a:avLst/>
+          </a:prstGeom>
+          <a:noFill/>
+          <a:ln cap="flat" cmpd="sng" w="19050">
+            <a:solidFill>
+              <a:srgbClr val="000000"/>
+            </a:solidFill>
+            <a:prstDash val="solid"/>
+            <a:round/>
+            <a:headEnd len="sm" w="sm" type="none"/>
+            <a:tailEnd len="sm" w="sm" type="none"/>
+          </a:ln>
+        </p:spPr>
+        <p:txBody>
+          <a:bodyPr anchorCtr="0" anchor="ctr" bIns="91425" lIns="91425" spcFirstLastPara="1" rIns="91425" wrap="square" tIns="91425">
+            <a:noAutofit/>
+          </a:bodyPr>
+          <a:lstStyle/>
+          <a:p>
+            <a:pPr indent="0" lvl="0" marL="0" rtl="0" algn="l">
+              <a:spcBef>
+                <a:spcPts val="0"/>
+              </a:spcBef>
+              <a:spcAft>
+                <a:spcPts val="0"/>
+              </a:spcAft>
+              <a:buNone/>
+            </a:pPr>
+            <a:r>
+              <a:rPr lang="en"/>
+              <a:t>z</a:t>
+            </a:r>
+            <a:endParaRPr/>
+          </a:p>
+        </p:txBody>
+      </p:sp>
+      <p:sp>
+        <p:nvSpPr>
+          <p:cNvPr id="1021" name="Google Shape;1021;p54"/>
+          <p:cNvSpPr/>
+          <p:nvPr/>
+        </p:nvSpPr>
+        <p:spPr>
+          <a:xfrm>
+            <a:off x="4178713" y="3917125"/>
+            <a:ext cx="257700" cy="269100"/>
+          </a:xfrm>
+          <a:prstGeom prst="ellipse">
+            <a:avLst/>
+          </a:prstGeom>
+          <a:noFill/>
+          <a:ln cap="flat" cmpd="sng" w="19050">
+            <a:solidFill>
+              <a:srgbClr val="000000"/>
+            </a:solidFill>
+            <a:prstDash val="solid"/>
+            <a:round/>
+            <a:headEnd len="sm" w="sm" type="none"/>
+            <a:tailEnd len="sm" w="sm" type="none"/>
+          </a:ln>
+        </p:spPr>
+        <p:txBody>
+          <a:bodyPr anchorCtr="0" anchor="ctr" bIns="91425" lIns="91425" spcFirstLastPara="1" rIns="91425" wrap="square" tIns="91425">
+            <a:noAutofit/>
+          </a:bodyPr>
+          <a:lstStyle/>
+          <a:p>
+            <a:pPr indent="0" lvl="0" marL="0" rtl="0" algn="l">
+              <a:spcBef>
+                <a:spcPts val="0"/>
+              </a:spcBef>
+              <a:spcAft>
+                <a:spcPts val="0"/>
+              </a:spcAft>
+              <a:buNone/>
+            </a:pPr>
+            <a:r>
+              <a:rPr lang="en"/>
+              <a:t>z</a:t>
+            </a:r>
+            <a:endParaRPr/>
+          </a:p>
+        </p:txBody>
+      </p:sp>
+      <p:sp>
+        <p:nvSpPr>
+          <p:cNvPr id="1022" name="Google Shape;1022;p54"/>
+          <p:cNvSpPr/>
+          <p:nvPr/>
+        </p:nvSpPr>
+        <p:spPr>
+          <a:xfrm>
+            <a:off x="4717313" y="3917125"/>
+            <a:ext cx="257700" cy="269100"/>
+          </a:xfrm>
+          <a:prstGeom prst="ellipse">
+            <a:avLst/>
+          </a:prstGeom>
+          <a:noFill/>
+          <a:ln cap="flat" cmpd="sng" w="19050">
+            <a:solidFill>
+              <a:srgbClr val="000000"/>
+            </a:solidFill>
+            <a:prstDash val="solid"/>
+            <a:round/>
+            <a:headEnd len="sm" w="sm" type="none"/>
+            <a:tailEnd len="sm" w="sm" type="none"/>
+          </a:ln>
+        </p:spPr>
+        <p:txBody>
+          <a:bodyPr anchorCtr="0" anchor="ctr" bIns="91425" lIns="91425" spcFirstLastPara="1" rIns="91425" wrap="square" tIns="91425">
+            <a:noAutofit/>
+          </a:bodyPr>
+          <a:lstStyle/>
+          <a:p>
+            <a:pPr indent="0" lvl="0" marL="0" rtl="0" algn="l">
+              <a:spcBef>
+                <a:spcPts val="0"/>
+              </a:spcBef>
+              <a:spcAft>
+                <a:spcPts val="0"/>
+              </a:spcAft>
+              <a:buNone/>
+            </a:pPr>
+            <a:r>
+              <a:rPr lang="en"/>
+              <a:t>x</a:t>
+            </a:r>
+            <a:endParaRPr/>
+          </a:p>
+        </p:txBody>
+      </p:sp>
+      <p:sp>
+        <p:nvSpPr>
+          <p:cNvPr id="1023" name="Google Shape;1023;p54"/>
+          <p:cNvSpPr/>
+          <p:nvPr/>
+        </p:nvSpPr>
+        <p:spPr>
+          <a:xfrm>
+            <a:off x="5255913" y="3917125"/>
+            <a:ext cx="257700" cy="269100"/>
+          </a:xfrm>
+          <a:prstGeom prst="ellipse">
+            <a:avLst/>
+          </a:prstGeom>
+          <a:noFill/>
+          <a:ln cap="flat" cmpd="sng" w="19050">
+            <a:solidFill>
+              <a:srgbClr val="000000"/>
+            </a:solidFill>
+            <a:prstDash val="solid"/>
+            <a:round/>
+            <a:headEnd len="sm" w="sm" type="none"/>
+            <a:tailEnd len="sm" w="sm" type="none"/>
+          </a:ln>
+        </p:spPr>
+        <p:txBody>
+          <a:bodyPr anchorCtr="0" anchor="ctr" bIns="91425" lIns="91425" spcFirstLastPara="1" rIns="91425" wrap="square" tIns="91425">
+            <a:noAutofit/>
+          </a:bodyPr>
+          <a:lstStyle/>
+          <a:p>
+            <a:pPr indent="0" lvl="0" marL="0" rtl="0" algn="l">
+              <a:spcBef>
+                <a:spcPts val="0"/>
+              </a:spcBef>
+              <a:spcAft>
+                <a:spcPts val="0"/>
+              </a:spcAft>
+              <a:buNone/>
+            </a:pPr>
+            <a:r>
+              <a:rPr lang="en"/>
+              <a:t>x</a:t>
+            </a:r>
+            <a:endParaRPr/>
+          </a:p>
+        </p:txBody>
+      </p:sp>
+      <p:sp>
+        <p:nvSpPr>
+          <p:cNvPr id="1024" name="Google Shape;1024;p54"/>
+          <p:cNvSpPr/>
+          <p:nvPr/>
+        </p:nvSpPr>
+        <p:spPr>
+          <a:xfrm>
+            <a:off x="5794513" y="3917125"/>
+            <a:ext cx="257700" cy="269100"/>
+          </a:xfrm>
+          <a:prstGeom prst="ellipse">
+            <a:avLst/>
+          </a:prstGeom>
+          <a:noFill/>
+          <a:ln cap="flat" cmpd="sng" w="19050">
+            <a:solidFill>
+              <a:srgbClr val="000000"/>
+            </a:solidFill>
+            <a:prstDash val="solid"/>
+            <a:round/>
+            <a:headEnd len="sm" w="sm" type="none"/>
+            <a:tailEnd len="sm" w="sm" type="none"/>
+          </a:ln>
+        </p:spPr>
+        <p:txBody>
+          <a:bodyPr anchorCtr="0" anchor="ctr" bIns="91425" lIns="91425" spcFirstLastPara="1" rIns="91425" wrap="square" tIns="91425">
+            <a:noAutofit/>
+          </a:bodyPr>
+          <a:lstStyle/>
+          <a:p>
+            <a:pPr indent="0" lvl="0" marL="0" rtl="0" algn="l">
+              <a:spcBef>
+                <a:spcPts val="0"/>
+              </a:spcBef>
+              <a:spcAft>
+                <a:spcPts val="0"/>
+              </a:spcAft>
+              <a:buNone/>
+            </a:pPr>
+            <a:r>
+              <a:rPr lang="en"/>
+              <a:t>x</a:t>
+            </a:r>
+            <a:endParaRPr/>
+          </a:p>
+        </p:txBody>
+      </p:sp>
+      <p:sp>
+        <p:nvSpPr>
+          <p:cNvPr id="1025" name="Google Shape;1025;p54"/>
+          <p:cNvSpPr/>
+          <p:nvPr/>
+        </p:nvSpPr>
+        <p:spPr>
+          <a:xfrm>
+            <a:off x="6333113" y="3917125"/>
+            <a:ext cx="257700" cy="269100"/>
+          </a:xfrm>
+          <a:prstGeom prst="ellipse">
+            <a:avLst/>
+          </a:prstGeom>
+          <a:noFill/>
+          <a:ln cap="flat" cmpd="sng" w="19050">
+            <a:solidFill>
+              <a:srgbClr val="000000"/>
+            </a:solidFill>
+            <a:prstDash val="solid"/>
+            <a:round/>
+            <a:headEnd len="sm" w="sm" type="none"/>
+            <a:tailEnd len="sm" w="sm" type="none"/>
+          </a:ln>
+        </p:spPr>
+        <p:txBody>
+          <a:bodyPr anchorCtr="0" anchor="ctr" bIns="91425" lIns="91425" spcFirstLastPara="1" rIns="91425" wrap="square" tIns="91425">
+            <a:noAutofit/>
+          </a:bodyPr>
+          <a:lstStyle/>
+          <a:p>
+            <a:pPr indent="0" lvl="0" marL="0" rtl="0" algn="l">
+              <a:spcBef>
+                <a:spcPts val="0"/>
+              </a:spcBef>
+              <a:spcAft>
+                <a:spcPts val="0"/>
+              </a:spcAft>
+              <a:buNone/>
+            </a:pPr>
+            <a:r>
+              <a:rPr lang="en"/>
+              <a:t>x</a:t>
+            </a:r>
+            <a:endParaRPr/>
+          </a:p>
+        </p:txBody>
+      </p:sp>
+      <p:sp>
+        <p:nvSpPr>
+          <p:cNvPr id="1026" name="Google Shape;1026;p54"/>
+          <p:cNvSpPr/>
+          <p:nvPr/>
+        </p:nvSpPr>
+        <p:spPr>
+          <a:xfrm>
+            <a:off x="6871713" y="3917125"/>
+            <a:ext cx="257700" cy="269100"/>
+          </a:xfrm>
+          <a:prstGeom prst="ellipse">
+            <a:avLst/>
+          </a:prstGeom>
+          <a:noFill/>
+          <a:ln cap="flat" cmpd="sng" w="19050">
+            <a:solidFill>
+              <a:srgbClr val="000000"/>
+            </a:solidFill>
+            <a:prstDash val="solid"/>
+            <a:round/>
+            <a:headEnd len="sm" w="sm" type="none"/>
+            <a:tailEnd len="sm" w="sm" type="none"/>
+          </a:ln>
+        </p:spPr>
+        <p:txBody>
+          <a:bodyPr anchorCtr="0" anchor="ctr" bIns="91425" lIns="91425" spcFirstLastPara="1" rIns="91425" wrap="square" tIns="91425">
+            <a:noAutofit/>
+          </a:bodyPr>
+          <a:lstStyle/>
+          <a:p>
+            <a:pPr indent="0" lvl="0" marL="0" rtl="0" algn="l">
+              <a:spcBef>
+                <a:spcPts val="0"/>
+              </a:spcBef>
+              <a:spcAft>
+                <a:spcPts val="0"/>
+              </a:spcAft>
+              <a:buNone/>
+            </a:pPr>
+            <a:r>
+              <a:rPr lang="en"/>
+              <a:t>x</a:t>
+            </a:r>
+            <a:endParaRPr/>
+          </a:p>
+        </p:txBody>
+      </p:sp>
+      <p:sp>
+        <p:nvSpPr>
+          <p:cNvPr id="1027" name="Google Shape;1027;p54"/>
+          <p:cNvSpPr/>
+          <p:nvPr/>
+        </p:nvSpPr>
+        <p:spPr>
+          <a:xfrm>
+            <a:off x="7410313" y="3917125"/>
+            <a:ext cx="257700" cy="269100"/>
+          </a:xfrm>
+          <a:prstGeom prst="ellipse">
+            <a:avLst/>
+          </a:prstGeom>
+          <a:noFill/>
+          <a:ln cap="flat" cmpd="sng" w="19050">
+            <a:solidFill>
+              <a:srgbClr val="000000"/>
+            </a:solidFill>
+            <a:prstDash val="solid"/>
+            <a:round/>
+            <a:headEnd len="sm" w="sm" type="none"/>
+            <a:tailEnd len="sm" w="sm" type="none"/>
+          </a:ln>
+        </p:spPr>
+        <p:txBody>
+          <a:bodyPr anchorCtr="0" anchor="ctr" bIns="91425" lIns="91425" spcFirstLastPara="1" rIns="91425" wrap="square" tIns="91425">
+            <a:noAutofit/>
+          </a:bodyPr>
+          <a:lstStyle/>
+          <a:p>
+            <a:pPr indent="0" lvl="0" marL="0" rtl="0" algn="l">
+              <a:spcBef>
+                <a:spcPts val="0"/>
+              </a:spcBef>
+              <a:spcAft>
+                <a:spcPts val="0"/>
+              </a:spcAft>
+              <a:buNone/>
+            </a:pPr>
+            <a:r>
+              <a:rPr lang="en"/>
+              <a:t>x</a:t>
+            </a:r>
+            <a:endParaRPr/>
+          </a:p>
+        </p:txBody>
+      </p:sp>
+      <p:sp>
+        <p:nvSpPr>
+          <p:cNvPr id="1028" name="Google Shape;1028;p54"/>
+          <p:cNvSpPr/>
+          <p:nvPr/>
+        </p:nvSpPr>
+        <p:spPr>
+          <a:xfrm>
+            <a:off x="7948913" y="3917125"/>
+            <a:ext cx="257700" cy="269100"/>
+          </a:xfrm>
+          <a:prstGeom prst="ellipse">
+            <a:avLst/>
+          </a:prstGeom>
+          <a:noFill/>
+          <a:ln cap="flat" cmpd="sng" w="19050">
+            <a:solidFill>
+              <a:srgbClr val="000000"/>
+            </a:solidFill>
+            <a:prstDash val="solid"/>
+            <a:round/>
+            <a:headEnd len="sm" w="sm" type="none"/>
+            <a:tailEnd len="sm" w="sm" type="none"/>
+          </a:ln>
+        </p:spPr>
+        <p:txBody>
+          <a:bodyPr anchorCtr="0" anchor="ctr" bIns="91425" lIns="91425" spcFirstLastPara="1" rIns="91425" wrap="square" tIns="91425">
+            <a:noAutofit/>
+          </a:bodyPr>
+          <a:lstStyle/>
+          <a:p>
+            <a:pPr indent="0" lvl="0" marL="0" rtl="0" algn="l">
+              <a:spcBef>
+                <a:spcPts val="0"/>
+              </a:spcBef>
+              <a:spcAft>
+                <a:spcPts val="0"/>
+              </a:spcAft>
+              <a:buNone/>
+            </a:pPr>
+            <a:r>
+              <a:rPr lang="en"/>
+              <a:t>x</a:t>
+            </a:r>
+            <a:endParaRPr/>
           </a:p>
         </p:txBody>
       </p:sp>
@@ -53561,6 +53561,285 @@
 </file>
 
 <file path=ppt/theme/theme1.xml><?xml version="1.0" encoding="utf-8"?>
+<a:theme xmlns:a="http://schemas.openxmlformats.org/drawingml/2006/main" xmlns:r="http://schemas.openxmlformats.org/officeDocument/2006/relationships" name="Tropic">
+  <a:themeElements>
+    <a:clrScheme name="Tropic">
+      <a:dk1>
+        <a:srgbClr val="A1E8D9"/>
+      </a:dk1>
+      <a:lt1>
+        <a:srgbClr val="FFFFFF"/>
+      </a:lt1>
+      <a:dk2>
+        <a:srgbClr val="695D46"/>
+      </a:dk2>
+      <a:lt2>
+        <a:srgbClr val="B3A77D"/>
+      </a:lt2>
+      <a:accent1>
+        <a:srgbClr val="EF6C00"/>
+      </a:accent1>
+      <a:accent2>
+        <a:srgbClr val="009668"/>
+      </a:accent2>
+      <a:accent3>
+        <a:srgbClr val="4DB6AC"/>
+      </a:accent3>
+      <a:accent4>
+        <a:srgbClr val="FF9800"/>
+      </a:accent4>
+      <a:accent5>
+        <a:srgbClr val="CE93D8"/>
+      </a:accent5>
+      <a:accent6>
+        <a:srgbClr val="EEFF41"/>
+      </a:accent6>
+      <a:hlink>
+        <a:srgbClr val="CE93D8"/>
+      </a:hlink>
+      <a:folHlink>
+        <a:srgbClr val="CE93D8"/>
+      </a:folHlink>
+    </a:clrScheme>
+    <a:fontScheme name="Office">
+      <a:majorFont>
+        <a:latin typeface="Arial"/>
+        <a:ea typeface=""/>
+        <a:cs typeface=""/>
+        <a:font script="Jpan" typeface="ＭＳ Ｐゴシック"/>
+        <a:font script="Hang" typeface="맑은 고딕"/>
+        <a:font script="Hans" typeface="宋体"/>
+        <a:font script="Hant" typeface="新細明體"/>
+        <a:font script="Arab" typeface="Times New Roman"/>
+        <a:font script="Hebr" typeface="Times New Roman"/>
+        <a:font script="Thai" typeface="Angsana New"/>
+        <a:font script="Ethi" typeface="Nyala"/>
+        <a:font script="Beng" typeface="Vrinda"/>
+        <a:font script="Gujr" typeface="Shruti"/>
+        <a:font script="Khmr" typeface="MoolBoran"/>
+        <a:font script="Knda" typeface="Tunga"/>
+        <a:font script="Guru" typeface="Raavi"/>
+        <a:font script="Cans" typeface="Euphemia"/>
+        <a:font script="Cher" typeface="Plantagenet Cherokee"/>
+        <a:font script="Yiii" typeface="Microsoft Yi Baiti"/>
+        <a:font script="Tibt" typeface="Microsoft Himalaya"/>
+        <a:font script="Thaa" typeface="MV Boli"/>
+        <a:font script="Deva" typeface="Mangal"/>
+        <a:font script="Telu" typeface="Gautami"/>
+        <a:font script="Taml" typeface="Latha"/>
+        <a:font script="Syrc" typeface="Estrangelo Edessa"/>
+        <a:font script="Orya" typeface="Kalinga"/>
+        <a:font script="Mlym" typeface="Kartika"/>
+        <a:font script="Laoo" typeface="DokChampa"/>
+        <a:font script="Sinh" typeface="Iskoola Pota"/>
+        <a:font script="Mong" typeface="Mongolian Baiti"/>
+        <a:font script="Viet" typeface="Times New Roman"/>
+        <a:font script="Uigh" typeface="Microsoft Uighur"/>
+        <a:font script="Geor" typeface="Sylfaen"/>
+      </a:majorFont>
+      <a:minorFont>
+        <a:latin typeface="Arial"/>
+        <a:ea typeface=""/>
+        <a:cs typeface=""/>
+        <a:font script="Jpan" typeface="ＭＳ Ｐゴシック"/>
+        <a:font script="Hang" typeface="맑은 고딕"/>
+        <a:font script="Hans" typeface="宋体"/>
+        <a:font script="Hant" typeface="新細明體"/>
+        <a:font script="Arab" typeface="Arial"/>
+        <a:font script="Hebr" typeface="Arial"/>
+        <a:font script="Thai" typeface="Cordia New"/>
+        <a:font script="Ethi" typeface="Nyala"/>
+        <a:font script="Beng" typeface="Vrinda"/>
+        <a:font script="Gujr" typeface="Shruti"/>
+        <a:font script="Khmr" typeface="DaunPenh"/>
+        <a:font script="Knda" typeface="Tunga"/>
+        <a:font script="Guru" typeface="Raavi"/>
+        <a:font script="Cans" typeface="Euphemia"/>
+        <a:font script="Cher" typeface="Plantagenet Cherokee"/>
+        <a:font script="Yiii" typeface="Microsoft Yi Baiti"/>
+        <a:font script="Tibt" typeface="Microsoft Himalaya"/>
+        <a:font script="Thaa" typeface="MV Boli"/>
+        <a:font script="Deva" typeface="Mangal"/>
+        <a:font script="Telu" typeface="Gautami"/>
+        <a:font script="Taml" typeface="Latha"/>
+        <a:font script="Syrc" typeface="Estrangelo Edessa"/>
+        <a:font script="Orya" typeface="Kalinga"/>
+        <a:font script="Mlym" typeface="Kartika"/>
+        <a:font script="Laoo" typeface="DokChampa"/>
+        <a:font script="Sinh" typeface="Iskoola Pota"/>
+        <a:font script="Mong" typeface="Mongolian Baiti"/>
+        <a:font script="Viet" typeface="Arial"/>
+        <a:font script="Uigh" typeface="Microsoft Uighur"/>
+        <a:font script="Geor" typeface="Sylfaen"/>
+      </a:minorFont>
+    </a:fontScheme>
+    <a:fmtScheme name="Office">
+      <a:fillStyleLst>
+        <a:solidFill>
+          <a:schemeClr val="phClr"/>
+        </a:solidFill>
+        <a:gradFill rotWithShape="1">
+          <a:gsLst>
+            <a:gs pos="0">
+              <a:schemeClr val="phClr">
+                <a:tint val="50000"/>
+                <a:satMod val="300000"/>
+              </a:schemeClr>
+            </a:gs>
+            <a:gs pos="35000">
+              <a:schemeClr val="phClr">
+                <a:tint val="37000"/>
+                <a:satMod val="300000"/>
+              </a:schemeClr>
+            </a:gs>
+            <a:gs pos="100000">
+              <a:schemeClr val="phClr">
+                <a:tint val="15000"/>
+                <a:satMod val="350000"/>
+              </a:schemeClr>
+            </a:gs>
+          </a:gsLst>
+          <a:lin ang="16200000" scaled="1"/>
+        </a:gradFill>
+        <a:gradFill rotWithShape="1">
+          <a:gsLst>
+            <a:gs pos="0">
+              <a:schemeClr val="phClr">
+                <a:tint val="100000"/>
+                <a:shade val="100000"/>
+                <a:satMod val="130000"/>
+              </a:schemeClr>
+            </a:gs>
+            <a:gs pos="100000">
+              <a:schemeClr val="phClr">
+                <a:tint val="50000"/>
+                <a:shade val="100000"/>
+                <a:satMod val="350000"/>
+              </a:schemeClr>
+            </a:gs>
+          </a:gsLst>
+          <a:lin ang="16200000" scaled="0"/>
+        </a:gradFill>
+      </a:fillStyleLst>
+      <a:lnStyleLst>
+        <a:ln w="9525" cap="flat" cmpd="sng" algn="ctr">
+          <a:solidFill>
+            <a:schemeClr val="phClr">
+              <a:shade val="95000"/>
+              <a:satMod val="105000"/>
+            </a:schemeClr>
+          </a:solidFill>
+          <a:prstDash val="solid"/>
+        </a:ln>
+        <a:ln w="25400" cap="flat" cmpd="sng" algn="ctr">
+          <a:solidFill>
+            <a:schemeClr val="phClr"/>
+          </a:solidFill>
+          <a:prstDash val="solid"/>
+        </a:ln>
+        <a:ln w="38100" cap="flat" cmpd="sng" algn="ctr">
+          <a:solidFill>
+            <a:schemeClr val="phClr"/>
+          </a:solidFill>
+          <a:prstDash val="solid"/>
+        </a:ln>
+      </a:lnStyleLst>
+      <a:effectStyleLst>
+        <a:effectStyle>
+          <a:effectLst>
+            <a:outerShdw blurRad="40000" dist="20000" dir="5400000" rotWithShape="0">
+              <a:srgbClr val="000000">
+                <a:alpha val="38000"/>
+              </a:srgbClr>
+            </a:outerShdw>
+          </a:effectLst>
+        </a:effectStyle>
+        <a:effectStyle>
+          <a:effectLst>
+            <a:outerShdw blurRad="40000" dist="23000" dir="5400000" rotWithShape="0">
+              <a:srgbClr val="000000">
+                <a:alpha val="35000"/>
+              </a:srgbClr>
+            </a:outerShdw>
+          </a:effectLst>
+        </a:effectStyle>
+        <a:effectStyle>
+          <a:effectLst>
+            <a:outerShdw blurRad="40000" dist="23000" dir="5400000" rotWithShape="0">
+              <a:srgbClr val="000000">
+                <a:alpha val="35000"/>
+              </a:srgbClr>
+            </a:outerShdw>
+          </a:effectLst>
+          <a:scene3d>
+            <a:camera prst="orthographicFront">
+              <a:rot lat="0" lon="0" rev="0"/>
+            </a:camera>
+            <a:lightRig rig="threePt" dir="t">
+              <a:rot lat="0" lon="0" rev="1200000"/>
+            </a:lightRig>
+          </a:scene3d>
+          <a:sp3d>
+            <a:bevelT w="63500" h="25400"/>
+          </a:sp3d>
+        </a:effectStyle>
+      </a:effectStyleLst>
+      <a:bgFillStyleLst>
+        <a:solidFill>
+          <a:schemeClr val="phClr"/>
+        </a:solidFill>
+        <a:gradFill rotWithShape="1">
+          <a:gsLst>
+            <a:gs pos="0">
+              <a:schemeClr val="phClr">
+                <a:tint val="40000"/>
+                <a:satMod val="350000"/>
+              </a:schemeClr>
+            </a:gs>
+            <a:gs pos="40000">
+              <a:schemeClr val="phClr">
+                <a:tint val="45000"/>
+                <a:shade val="99000"/>
+                <a:satMod val="350000"/>
+              </a:schemeClr>
+            </a:gs>
+            <a:gs pos="100000">
+              <a:schemeClr val="phClr">
+                <a:shade val="20000"/>
+                <a:satMod val="255000"/>
+              </a:schemeClr>
+            </a:gs>
+          </a:gsLst>
+          <a:path path="circle">
+            <a:fillToRect l="50000" t="-80000" r="50000" b="180000"/>
+          </a:path>
+        </a:gradFill>
+        <a:gradFill rotWithShape="1">
+          <a:gsLst>
+            <a:gs pos="0">
+              <a:schemeClr val="phClr">
+                <a:tint val="80000"/>
+                <a:satMod val="300000"/>
+              </a:schemeClr>
+            </a:gs>
+            <a:gs pos="100000">
+              <a:schemeClr val="phClr">
+                <a:shade val="30000"/>
+                <a:satMod val="200000"/>
+              </a:schemeClr>
+            </a:gs>
+          </a:gsLst>
+          <a:path path="circle">
+            <a:fillToRect l="50000" t="50000" r="50000" b="50000"/>
+          </a:path>
+        </a:gradFill>
+      </a:bgFillStyleLst>
+    </a:fmtScheme>
+  </a:themeElements>
+</a:theme>
+</file>
+
+<file path=ppt/theme/theme2.xml><?xml version="1.0" encoding="utf-8"?>
 <a:theme xmlns:a="http://schemas.openxmlformats.org/drawingml/2006/main" xmlns:r="http://schemas.openxmlformats.org/officeDocument/2006/relationships">
   <a:themeElements>
     <a:clrScheme name="Default">
@@ -53837,283 +54116,4 @@
     </a:fmtScheme>
   </a:themeElements>
 </a:theme>
-</file>
-
-<file path=ppt/theme/theme2.xml><?xml version="1.0" encoding="utf-8"?>
-<a:theme xmlns:a="http://schemas.openxmlformats.org/drawingml/2006/main" xmlns:r="http://schemas.openxmlformats.org/officeDocument/2006/relationships" name="Tropic">
-  <a:themeElements>
-    <a:clrScheme name="Tropic">
-      <a:dk1>
-        <a:srgbClr val="A1E8D9"/>
-      </a:dk1>
-      <a:lt1>
-        <a:srgbClr val="FFFFFF"/>
-      </a:lt1>
-      <a:dk2>
-        <a:srgbClr val="695D46"/>
-      </a:dk2>
-      <a:lt2>
-        <a:srgbClr val="B3A77D"/>
-      </a:lt2>
-      <a:accent1>
-        <a:srgbClr val="EF6C00"/>
-      </a:accent1>
-      <a:accent2>
-        <a:srgbClr val="009668"/>
-      </a:accent2>
-      <a:accent3>
-        <a:srgbClr val="4DB6AC"/>
-      </a:accent3>
-      <a:accent4>
-        <a:srgbClr val="FF9800"/>
-      </a:accent4>
-      <a:accent5>
-        <a:srgbClr val="CE93D8"/>
-      </a:accent5>
-      <a:accent6>
-        <a:srgbClr val="EEFF41"/>
-      </a:accent6>
-      <a:hlink>
-        <a:srgbClr val="CE93D8"/>
-      </a:hlink>
-      <a:folHlink>
-        <a:srgbClr val="CE93D8"/>
-      </a:folHlink>
-    </a:clrScheme>
-    <a:fontScheme name="Office">
-      <a:majorFont>
-        <a:latin typeface="Arial"/>
-        <a:ea typeface=""/>
-        <a:cs typeface=""/>
-        <a:font script="Jpan" typeface="ＭＳ Ｐゴシック"/>
-        <a:font script="Hang" typeface="맑은 고딕"/>
-        <a:font script="Hans" typeface="宋体"/>
-        <a:font script="Hant" typeface="新細明體"/>
-        <a:font script="Arab" typeface="Times New Roman"/>
-        <a:font script="Hebr" typeface="Times New Roman"/>
-        <a:font script="Thai" typeface="Angsana New"/>
-        <a:font script="Ethi" typeface="Nyala"/>
-        <a:font script="Beng" typeface="Vrinda"/>
-        <a:font script="Gujr" typeface="Shruti"/>
-        <a:font script="Khmr" typeface="MoolBoran"/>
-        <a:font script="Knda" typeface="Tunga"/>
-        <a:font script="Guru" typeface="Raavi"/>
-        <a:font script="Cans" typeface="Euphemia"/>
-        <a:font script="Cher" typeface="Plantagenet Cherokee"/>
-        <a:font script="Yiii" typeface="Microsoft Yi Baiti"/>
-        <a:font script="Tibt" typeface="Microsoft Himalaya"/>
-        <a:font script="Thaa" typeface="MV Boli"/>
-        <a:font script="Deva" typeface="Mangal"/>
-        <a:font script="Telu" typeface="Gautami"/>
-        <a:font script="Taml" typeface="Latha"/>
-        <a:font script="Syrc" typeface="Estrangelo Edessa"/>
-        <a:font script="Orya" typeface="Kalinga"/>
-        <a:font script="Mlym" typeface="Kartika"/>
-        <a:font script="Laoo" typeface="DokChampa"/>
-        <a:font script="Sinh" typeface="Iskoola Pota"/>
-        <a:font script="Mong" typeface="Mongolian Baiti"/>
-        <a:font script="Viet" typeface="Times New Roman"/>
-        <a:font script="Uigh" typeface="Microsoft Uighur"/>
-        <a:font script="Geor" typeface="Sylfaen"/>
-      </a:majorFont>
-      <a:minorFont>
-        <a:latin typeface="Arial"/>
-        <a:ea typeface=""/>
-        <a:cs typeface=""/>
-        <a:font script="Jpan" typeface="ＭＳ Ｐゴシック"/>
-        <a:font script="Hang" typeface="맑은 고딕"/>
-        <a:font script="Hans" typeface="宋体"/>
-        <a:font script="Hant" typeface="新細明體"/>
-        <a:font script="Arab" typeface="Arial"/>
-        <a:font script="Hebr" typeface="Arial"/>
-        <a:font script="Thai" typeface="Cordia New"/>
-        <a:font script="Ethi" typeface="Nyala"/>
-        <a:font script="Beng" typeface="Vrinda"/>
-        <a:font script="Gujr" typeface="Shruti"/>
-        <a:font script="Khmr" typeface="DaunPenh"/>
-        <a:font script="Knda" typeface="Tunga"/>
-        <a:font script="Guru" typeface="Raavi"/>
-        <a:font script="Cans" typeface="Euphemia"/>
-        <a:font script="Cher" typeface="Plantagenet Cherokee"/>
-        <a:font script="Yiii" typeface="Microsoft Yi Baiti"/>
-        <a:font script="Tibt" typeface="Microsoft Himalaya"/>
-        <a:font script="Thaa" typeface="MV Boli"/>
-        <a:font script="Deva" typeface="Mangal"/>
-        <a:font script="Telu" typeface="Gautami"/>
-        <a:font script="Taml" typeface="Latha"/>
-        <a:font script="Syrc" typeface="Estrangelo Edessa"/>
-        <a:font script="Orya" typeface="Kalinga"/>
-        <a:font script="Mlym" typeface="Kartika"/>
-        <a:font script="Laoo" typeface="DokChampa"/>
-        <a:font script="Sinh" typeface="Iskoola Pota"/>
-        <a:font script="Mong" typeface="Mongolian Baiti"/>
-        <a:font script="Viet" typeface="Arial"/>
-        <a:font script="Uigh" typeface="Microsoft Uighur"/>
-        <a:font script="Geor" typeface="Sylfaen"/>
-      </a:minorFont>
-    </a:fontScheme>
-    <a:fmtScheme name="Office">
-      <a:fillStyleLst>
-        <a:solidFill>
-          <a:schemeClr val="phClr"/>
-        </a:solidFill>
-        <a:gradFill rotWithShape="1">
-          <a:gsLst>
-            <a:gs pos="0">
-              <a:schemeClr val="phClr">
-                <a:tint val="50000"/>
-                <a:satMod val="300000"/>
-              </a:schemeClr>
-            </a:gs>
-            <a:gs pos="35000">
-              <a:schemeClr val="phClr">
-                <a:tint val="37000"/>
-                <a:satMod val="300000"/>
-              </a:schemeClr>
-            </a:gs>
-            <a:gs pos="100000">
-              <a:schemeClr val="phClr">
-                <a:tint val="15000"/>
-                <a:satMod val="350000"/>
-              </a:schemeClr>
-            </a:gs>
-          </a:gsLst>
-          <a:lin ang="16200000" scaled="1"/>
-        </a:gradFill>
-        <a:gradFill rotWithShape="1">
-          <a:gsLst>
-            <a:gs pos="0">
-              <a:schemeClr val="phClr">
-                <a:tint val="100000"/>
-                <a:shade val="100000"/>
-                <a:satMod val="130000"/>
-              </a:schemeClr>
-            </a:gs>
-            <a:gs pos="100000">
-              <a:schemeClr val="phClr">
-                <a:tint val="50000"/>
-                <a:shade val="100000"/>
-                <a:satMod val="350000"/>
-              </a:schemeClr>
-            </a:gs>
-          </a:gsLst>
-          <a:lin ang="16200000" scaled="0"/>
-        </a:gradFill>
-      </a:fillStyleLst>
-      <a:lnStyleLst>
-        <a:ln w="9525" cap="flat" cmpd="sng" algn="ctr">
-          <a:solidFill>
-            <a:schemeClr val="phClr">
-              <a:shade val="95000"/>
-              <a:satMod val="105000"/>
-            </a:schemeClr>
-          </a:solidFill>
-          <a:prstDash val="solid"/>
-        </a:ln>
-        <a:ln w="25400" cap="flat" cmpd="sng" algn="ctr">
-          <a:solidFill>
-            <a:schemeClr val="phClr"/>
-          </a:solidFill>
-          <a:prstDash val="solid"/>
-        </a:ln>
-        <a:ln w="38100" cap="flat" cmpd="sng" algn="ctr">
-          <a:solidFill>
-            <a:schemeClr val="phClr"/>
-          </a:solidFill>
-          <a:prstDash val="solid"/>
-        </a:ln>
-      </a:lnStyleLst>
-      <a:effectStyleLst>
-        <a:effectStyle>
-          <a:effectLst>
-            <a:outerShdw blurRad="40000" dist="20000" dir="5400000" rotWithShape="0">
-              <a:srgbClr val="000000">
-                <a:alpha val="38000"/>
-              </a:srgbClr>
-            </a:outerShdw>
-          </a:effectLst>
-        </a:effectStyle>
-        <a:effectStyle>
-          <a:effectLst>
-            <a:outerShdw blurRad="40000" dist="23000" dir="5400000" rotWithShape="0">
-              <a:srgbClr val="000000">
-                <a:alpha val="35000"/>
-              </a:srgbClr>
-            </a:outerShdw>
-          </a:effectLst>
-        </a:effectStyle>
-        <a:effectStyle>
-          <a:effectLst>
-            <a:outerShdw blurRad="40000" dist="23000" dir="5400000" rotWithShape="0">
-              <a:srgbClr val="000000">
-                <a:alpha val="35000"/>
-              </a:srgbClr>
-            </a:outerShdw>
-          </a:effectLst>
-          <a:scene3d>
-            <a:camera prst="orthographicFront">
-              <a:rot lat="0" lon="0" rev="0"/>
-            </a:camera>
-            <a:lightRig rig="threePt" dir="t">
-              <a:rot lat="0" lon="0" rev="1200000"/>
-            </a:lightRig>
-          </a:scene3d>
-          <a:sp3d>
-            <a:bevelT w="63500" h="25400"/>
-          </a:sp3d>
-        </a:effectStyle>
-      </a:effectStyleLst>
-      <a:bgFillStyleLst>
-        <a:solidFill>
-          <a:schemeClr val="phClr"/>
-        </a:solidFill>
-        <a:gradFill rotWithShape="1">
-          <a:gsLst>
-            <a:gs pos="0">
-              <a:schemeClr val="phClr">
-                <a:tint val="40000"/>
-                <a:satMod val="350000"/>
-              </a:schemeClr>
-            </a:gs>
-            <a:gs pos="40000">
-              <a:schemeClr val="phClr">
-                <a:tint val="45000"/>
-                <a:shade val="99000"/>
-                <a:satMod val="350000"/>
-              </a:schemeClr>
-            </a:gs>
-            <a:gs pos="100000">
-              <a:schemeClr val="phClr">
-                <a:shade val="20000"/>
-                <a:satMod val="255000"/>
-              </a:schemeClr>
-            </a:gs>
-          </a:gsLst>
-          <a:path path="circle">
-            <a:fillToRect l="50000" t="-80000" r="50000" b="180000"/>
-          </a:path>
-        </a:gradFill>
-        <a:gradFill rotWithShape="1">
-          <a:gsLst>
-            <a:gs pos="0">
-              <a:schemeClr val="phClr">
-                <a:tint val="80000"/>
-                <a:satMod val="300000"/>
-              </a:schemeClr>
-            </a:gs>
-            <a:gs pos="100000">
-              <a:schemeClr val="phClr">
-                <a:shade val="30000"/>
-                <a:satMod val="200000"/>
-              </a:schemeClr>
-            </a:gs>
-          </a:gsLst>
-          <a:path path="circle">
-            <a:fillToRect l="50000" t="50000" r="50000" b="50000"/>
-          </a:path>
-        </a:gradFill>
-      </a:bgFillStyleLst>
-    </a:fmtScheme>
-  </a:themeElements>
-</a:theme>
 </file>
</xml_diff>